<commit_message>
Adding non-food values to data.
</commit_message>
<xml_diff>
--- a/consumption/presentationOct2021.pptx
+++ b/consumption/presentationOct2021.pptx
@@ -6,10 +6,10 @@
     <p:sldMasterId id="2147483669" r:id="rId2"/>
   </p:sldMasterIdLst>
   <p:notesMasterIdLst>
-    <p:notesMasterId r:id="rId18"/>
+    <p:notesMasterId r:id="rId20"/>
   </p:notesMasterIdLst>
   <p:handoutMasterIdLst>
-    <p:handoutMasterId r:id="rId19"/>
+    <p:handoutMasterId r:id="rId21"/>
   </p:handoutMasterIdLst>
   <p:sldIdLst>
     <p:sldId id="301" r:id="rId3"/>
@@ -23,45 +23,47 @@
     <p:sldId id="339" r:id="rId11"/>
     <p:sldId id="344" r:id="rId12"/>
     <p:sldId id="324" r:id="rId13"/>
-    <p:sldId id="337" r:id="rId14"/>
+    <p:sldId id="346" r:id="rId14"/>
     <p:sldId id="343" r:id="rId15"/>
     <p:sldId id="345" r:id="rId16"/>
-    <p:sldId id="320" r:id="rId17"/>
+    <p:sldId id="347" r:id="rId17"/>
+    <p:sldId id="337" r:id="rId18"/>
+    <p:sldId id="320" r:id="rId19"/>
   </p:sldIdLst>
   <p:sldSz cx="9144000" cy="5143500" type="screen16x9"/>
   <p:notesSz cx="6718300" cy="9867900"/>
   <p:embeddedFontLst>
     <p:embeddedFont>
       <p:font typeface="Calibri" panose="020F0502020204030204" pitchFamily="34" charset="0"/>
-      <p:regular r:id="rId20"/>
-      <p:bold r:id="rId21"/>
-      <p:italic r:id="rId22"/>
-      <p:boldItalic r:id="rId23"/>
+      <p:regular r:id="rId22"/>
+      <p:bold r:id="rId23"/>
+      <p:italic r:id="rId24"/>
+      <p:boldItalic r:id="rId25"/>
     </p:embeddedFont>
     <p:embeddedFont>
       <p:font typeface="Calibri Light" panose="020F0302020204030204" pitchFamily="34" charset="0"/>
-      <p:regular r:id="rId24"/>
-      <p:italic r:id="rId25"/>
+      <p:regular r:id="rId26"/>
+      <p:italic r:id="rId27"/>
     </p:embeddedFont>
     <p:embeddedFont>
       <p:font typeface="Cambria Math" panose="02040503050406030204" pitchFamily="18" charset="0"/>
-      <p:regular r:id="rId26"/>
+      <p:regular r:id="rId28"/>
     </p:embeddedFont>
     <p:embeddedFont>
       <p:font typeface="Effra" panose="020B0604020202020204" charset="0"/>
-      <p:regular r:id="rId27"/>
-      <p:bold r:id="rId28"/>
-      <p:italic r:id="rId29"/>
-      <p:boldItalic r:id="rId30"/>
+      <p:regular r:id="rId29"/>
+      <p:bold r:id="rId30"/>
+      <p:italic r:id="rId31"/>
+      <p:boldItalic r:id="rId32"/>
     </p:embeddedFont>
     <p:embeddedFont>
       <p:font typeface="Effra Bold" panose="020B0604020202020204" charset="0"/>
-      <p:bold r:id="rId31"/>
+      <p:bold r:id="rId33"/>
     </p:embeddedFont>
     <p:embeddedFont>
       <p:font typeface="Effra Light" panose="020B0604020202020204" charset="0"/>
-      <p:regular r:id="rId32"/>
-      <p:italic r:id="rId33"/>
+      <p:regular r:id="rId34"/>
+      <p:italic r:id="rId35"/>
     </p:embeddedFont>
   </p:embeddedFontLst>
   <p:defaultTextStyle>
@@ -7493,7 +7495,7 @@
               <a:pPr>
                 <a:defRPr/>
               </a:pPr>
-              <a:t>10/19/2021</a:t>
+              <a:t>10/20/2021</a:t>
             </a:fld>
             <a:endParaRPr lang="en-US" altLang="en-US"/>
           </a:p>
@@ -7934,7 +7936,7 @@
               <a:pPr>
                 <a:defRPr/>
               </a:pPr>
-              <a:t>10/19/2021</a:t>
+              <a:t>10/20/2021</a:t>
             </a:fld>
             <a:endParaRPr lang="en-US" altLang="en-US"/>
           </a:p>
@@ -8165,7 +8167,7 @@
               <a:pPr>
                 <a:defRPr/>
               </a:pPr>
-              <a:t>10/19/2021</a:t>
+              <a:t>10/20/2021</a:t>
             </a:fld>
             <a:endParaRPr lang="en-US" altLang="en-US"/>
           </a:p>
@@ -8364,7 +8366,7 @@
               <a:pPr>
                 <a:defRPr/>
               </a:pPr>
-              <a:t>10/19/2021</a:t>
+              <a:t>10/20/2021</a:t>
             </a:fld>
             <a:endParaRPr lang="en-US"/>
           </a:p>
@@ -8639,7 +8641,7 @@
               <a:pPr>
                 <a:defRPr/>
               </a:pPr>
-              <a:t>10/19/2021</a:t>
+              <a:t>10/20/2021</a:t>
             </a:fld>
             <a:endParaRPr lang="en-US"/>
           </a:p>
@@ -8899,7 +8901,7 @@
               <a:pPr>
                 <a:defRPr/>
               </a:pPr>
-              <a:t>10/19/2021</a:t>
+              <a:t>10/20/2021</a:t>
             </a:fld>
             <a:endParaRPr lang="en-US" altLang="en-US"/>
           </a:p>
@@ -9294,7 +9296,7 @@
               <a:pPr>
                 <a:defRPr/>
               </a:pPr>
-              <a:t>10/19/2021</a:t>
+              <a:t>10/20/2021</a:t>
             </a:fld>
             <a:endParaRPr lang="en-US"/>
           </a:p>
@@ -9442,7 +9444,7 @@
               <a:pPr>
                 <a:defRPr/>
               </a:pPr>
-              <a:t>10/19/2021</a:t>
+              <a:t>10/20/2021</a:t>
             </a:fld>
             <a:endParaRPr lang="en-US"/>
           </a:p>
@@ -9568,7 +9570,7 @@
               <a:pPr>
                 <a:defRPr/>
               </a:pPr>
-              <a:t>10/19/2021</a:t>
+              <a:t>10/20/2021</a:t>
             </a:fld>
             <a:endParaRPr lang="en-US"/>
           </a:p>
@@ -9874,7 +9876,7 @@
               <a:pPr>
                 <a:defRPr/>
               </a:pPr>
-              <a:t>10/19/2021</a:t>
+              <a:t>10/20/2021</a:t>
             </a:fld>
             <a:endParaRPr lang="en-US"/>
           </a:p>
@@ -10158,7 +10160,7 @@
               <a:pPr>
                 <a:defRPr/>
               </a:pPr>
-              <a:t>10/19/2021</a:t>
+              <a:t>10/20/2021</a:t>
             </a:fld>
             <a:endParaRPr lang="en-US"/>
           </a:p>
@@ -11596,7 +11598,7 @@
               <a:pPr>
                 <a:defRPr/>
               </a:pPr>
-              <a:t>10/19/2021</a:t>
+              <a:t>10/20/2021</a:t>
             </a:fld>
             <a:endParaRPr lang="en-US"/>
           </a:p>
@@ -11805,7 +11807,7 @@
               <a:pPr>
                 <a:defRPr/>
               </a:pPr>
-              <a:t>10/19/2021</a:t>
+              <a:t>10/20/2021</a:t>
             </a:fld>
             <a:endParaRPr lang="en-US"/>
           </a:p>
@@ -16206,7 +16208,7 @@
               <a:pPr>
                 <a:defRPr/>
               </a:pPr>
-              <a:t>10/19/2021</a:t>
+              <a:t>10/20/2021</a:t>
             </a:fld>
             <a:endParaRPr lang="en-US"/>
           </a:p>
@@ -18209,7 +18211,7 @@
           <p:cNvPr id="2" name="Title 1">
             <a:extLst>
               <a:ext uri="{FF2B5EF4-FFF2-40B4-BE49-F238E27FC236}">
-                <a16:creationId xmlns:a16="http://schemas.microsoft.com/office/drawing/2014/main" id="{0BFD862A-E2C5-4015-9F48-E21EBBEC1398}"/>
+                <a16:creationId xmlns:a16="http://schemas.microsoft.com/office/drawing/2014/main" id="{D1F63A37-7993-450F-8C74-F359EBC36293}"/>
               </a:ext>
             </a:extLst>
           </p:cNvPr>
@@ -18226,9 +18228,10 @@
           <a:lstStyle/>
           <a:p>
             <a:r>
-              <a:rPr lang="en-GB" dirty="0"/>
-              <a:t>How is this different from visible consumption?</a:t>
-            </a:r>
+              <a:rPr lang="en-US" dirty="0"/>
+              <a:t>Comparing two economies – the role of occupation vs region</a:t>
+            </a:r>
+            <a:endParaRPr lang="en-GB" dirty="0"/>
           </a:p>
         </p:txBody>
       </p:sp>
@@ -18237,7 +18240,7 @@
           <p:cNvPr id="3" name="Content Placeholder 2">
             <a:extLst>
               <a:ext uri="{FF2B5EF4-FFF2-40B4-BE49-F238E27FC236}">
-                <a16:creationId xmlns:a16="http://schemas.microsoft.com/office/drawing/2014/main" id="{8E165D5A-616B-4E7A-B5B6-2C1A87ADB63C}"/>
+                <a16:creationId xmlns:a16="http://schemas.microsoft.com/office/drawing/2014/main" id="{D2AE532F-81CE-4C13-8B35-E11C80EB34F5}"/>
               </a:ext>
             </a:extLst>
           </p:cNvPr>
@@ -18248,22 +18251,24 @@
             <p:ph idx="1"/>
           </p:nvPr>
         </p:nvSpPr>
-        <p:spPr>
-          <a:xfrm>
-            <a:off x="628650" y="1443038"/>
-            <a:ext cx="7886700" cy="3262312"/>
-          </a:xfrm>
-        </p:spPr>
-        <p:txBody>
-          <a:bodyPr>
-            <a:normAutofit/>
-          </a:bodyPr>
+        <p:spPr/>
+        <p:txBody>
+          <a:bodyPr/>
           <a:lstStyle/>
           <a:p>
             <a:r>
-              <a:rPr lang="en-GB" dirty="0"/>
-              <a:t>The LSMS data shows many opportunities for visible consumption – e.g. marriage price, expenditure on carpets rugs – but there too the effect of urban-rural differences dominates</a:t>
-            </a:r>
+              <a:rPr lang="en-US" dirty="0"/>
+              <a:t>We </a:t>
+            </a:r>
+            <a:r>
+              <a:rPr lang="en-US" dirty="0" err="1"/>
+              <a:t>standardise</a:t>
+            </a:r>
+            <a:r>
+              <a:rPr lang="en-US" dirty="0"/>
+              <a:t> occupations into occupation ranks for comparison</a:t>
+            </a:r>
+            <a:endParaRPr lang="en-GB" dirty="0"/>
           </a:p>
         </p:txBody>
       </p:sp>
@@ -18272,7 +18277,7 @@
           <p:cNvPr id="4" name="Slide Number Placeholder 3">
             <a:extLst>
               <a:ext uri="{FF2B5EF4-FFF2-40B4-BE49-F238E27FC236}">
-                <a16:creationId xmlns:a16="http://schemas.microsoft.com/office/drawing/2014/main" id="{DA097299-24FE-4400-A473-449518E30133}"/>
+                <a16:creationId xmlns:a16="http://schemas.microsoft.com/office/drawing/2014/main" id="{9383F4EE-6F49-4F2E-A328-04EE6321C67A}"/>
               </a:ext>
             </a:extLst>
           </p:cNvPr>
@@ -18305,7 +18310,7 @@
     </p:spTree>
     <p:extLst>
       <p:ext uri="{BB962C8B-B14F-4D97-AF65-F5344CB8AC3E}">
-        <p14:creationId xmlns:p14="http://schemas.microsoft.com/office/powerpoint/2010/main" val="3963713830"/>
+        <p14:creationId xmlns:p14="http://schemas.microsoft.com/office/powerpoint/2010/main" val="3887913961"/>
       </p:ext>
     </p:extLst>
   </p:cSld>
@@ -18388,6 +18393,12 @@
             <a:r>
               <a:rPr lang="en-GB" dirty="0"/>
               <a:t>The non-parametric view of data shows vast differences in assets</a:t>
+            </a:r>
+          </a:p>
+          <a:p>
+            <a:r>
+              <a:rPr lang="en-GB" dirty="0"/>
+              <a:t>The overall role of occupation is strong in Tanzania</a:t>
             </a:r>
           </a:p>
           <a:p>
@@ -18526,6 +18537,14 @@
           <a:bodyPr/>
           <a:lstStyle/>
           <a:p>
+            <a:r>
+              <a:rPr lang="en-US" dirty="0"/>
+              <a:t>The non-parametric plot </a:t>
+            </a:r>
+            <a:r>
+              <a:rPr lang="en-US"/>
+              <a:t>for Nigeria.</a:t>
+            </a:r>
             <a:endParaRPr lang="en-GB"/>
           </a:p>
         </p:txBody>
@@ -18603,6 +18622,269 @@
           <p:cNvPr id="2" name="Title 1">
             <a:extLst>
               <a:ext uri="{FF2B5EF4-FFF2-40B4-BE49-F238E27FC236}">
+                <a16:creationId xmlns:a16="http://schemas.microsoft.com/office/drawing/2014/main" id="{1E281EA7-B51E-4DC4-83AC-69973366C6BA}"/>
+              </a:ext>
+            </a:extLst>
+          </p:cNvPr>
+          <p:cNvSpPr>
+            <a:spLocks noGrp="1"/>
+          </p:cNvSpPr>
+          <p:nvPr>
+            <p:ph type="title"/>
+          </p:nvPr>
+        </p:nvSpPr>
+        <p:spPr/>
+        <p:txBody>
+          <a:bodyPr/>
+          <a:lstStyle/>
+          <a:p>
+            <a:r>
+              <a:rPr lang="en-US" dirty="0"/>
+              <a:t>Finer details with quantile regression</a:t>
+            </a:r>
+            <a:endParaRPr lang="en-GB" dirty="0"/>
+          </a:p>
+        </p:txBody>
+      </p:sp>
+      <p:sp>
+        <p:nvSpPr>
+          <p:cNvPr id="3" name="Content Placeholder 2">
+            <a:extLst>
+              <a:ext uri="{FF2B5EF4-FFF2-40B4-BE49-F238E27FC236}">
+                <a16:creationId xmlns:a16="http://schemas.microsoft.com/office/drawing/2014/main" id="{5FB0481C-346A-45D5-BE87-16CD5476AF6A}"/>
+              </a:ext>
+            </a:extLst>
+          </p:cNvPr>
+          <p:cNvSpPr>
+            <a:spLocks noGrp="1"/>
+          </p:cNvSpPr>
+          <p:nvPr>
+            <p:ph idx="1"/>
+          </p:nvPr>
+        </p:nvSpPr>
+        <p:spPr/>
+        <p:txBody>
+          <a:bodyPr/>
+          <a:lstStyle/>
+          <a:p>
+            <a:r>
+              <a:rPr lang="en-US" dirty="0"/>
+              <a:t>Tanzania</a:t>
+            </a:r>
+          </a:p>
+          <a:p>
+            <a:r>
+              <a:rPr lang="en-US"/>
+              <a:t>Nigeria</a:t>
+            </a:r>
+            <a:endParaRPr lang="en-GB"/>
+          </a:p>
+        </p:txBody>
+      </p:sp>
+      <p:sp>
+        <p:nvSpPr>
+          <p:cNvPr id="4" name="Slide Number Placeholder 3">
+            <a:extLst>
+              <a:ext uri="{FF2B5EF4-FFF2-40B4-BE49-F238E27FC236}">
+                <a16:creationId xmlns:a16="http://schemas.microsoft.com/office/drawing/2014/main" id="{AD7169C2-F41A-40EE-A210-49C6A0A94BEF}"/>
+              </a:ext>
+            </a:extLst>
+          </p:cNvPr>
+          <p:cNvSpPr>
+            <a:spLocks noGrp="1"/>
+          </p:cNvSpPr>
+          <p:nvPr>
+            <p:ph type="sldNum" sz="quarter" idx="12"/>
+          </p:nvPr>
+        </p:nvSpPr>
+        <p:spPr/>
+        <p:txBody>
+          <a:bodyPr/>
+          <a:lstStyle/>
+          <a:p>
+            <a:pPr>
+              <a:defRPr/>
+            </a:pPr>
+            <a:fld id="{8E35B453-7314-4BBD-9303-11C6BECC4B0D}" type="slidenum">
+              <a:rPr lang="en-GB" altLang="en-US" smtClean="0"/>
+              <a:pPr>
+                <a:defRPr/>
+              </a:pPr>
+              <a:t>15</a:t>
+            </a:fld>
+            <a:endParaRPr lang="en-GB" altLang="en-US" dirty="0"/>
+          </a:p>
+        </p:txBody>
+      </p:sp>
+    </p:spTree>
+    <p:extLst>
+      <p:ext uri="{BB962C8B-B14F-4D97-AF65-F5344CB8AC3E}">
+        <p14:creationId xmlns:p14="http://schemas.microsoft.com/office/powerpoint/2010/main" val="3432941902"/>
+      </p:ext>
+    </p:extLst>
+  </p:cSld>
+  <p:clrMapOvr>
+    <a:masterClrMapping/>
+  </p:clrMapOvr>
+  <p:transition>
+    <p:fade/>
+  </p:transition>
+</p:sld>
+</file>
+
+<file path=ppt/slides/slide16.xml><?xml version="1.0" encoding="utf-8"?>
+<p:sld xmlns:a="http://schemas.openxmlformats.org/drawingml/2006/main" xmlns:r="http://schemas.openxmlformats.org/officeDocument/2006/relationships" xmlns:p="http://schemas.openxmlformats.org/presentationml/2006/main">
+  <p:cSld>
+    <p:spTree>
+      <p:nvGrpSpPr>
+        <p:cNvPr id="1" name=""/>
+        <p:cNvGrpSpPr/>
+        <p:nvPr/>
+      </p:nvGrpSpPr>
+      <p:grpSpPr>
+        <a:xfrm>
+          <a:off x="0" y="0"/>
+          <a:ext cx="0" cy="0"/>
+          <a:chOff x="0" y="0"/>
+          <a:chExt cx="0" cy="0"/>
+        </a:xfrm>
+      </p:grpSpPr>
+      <p:sp>
+        <p:nvSpPr>
+          <p:cNvPr id="2" name="Title 1">
+            <a:extLst>
+              <a:ext uri="{FF2B5EF4-FFF2-40B4-BE49-F238E27FC236}">
+                <a16:creationId xmlns:a16="http://schemas.microsoft.com/office/drawing/2014/main" id="{0BFD862A-E2C5-4015-9F48-E21EBBEC1398}"/>
+              </a:ext>
+            </a:extLst>
+          </p:cNvPr>
+          <p:cNvSpPr>
+            <a:spLocks noGrp="1"/>
+          </p:cNvSpPr>
+          <p:nvPr>
+            <p:ph type="title"/>
+          </p:nvPr>
+        </p:nvSpPr>
+        <p:spPr/>
+        <p:txBody>
+          <a:bodyPr/>
+          <a:lstStyle/>
+          <a:p>
+            <a:r>
+              <a:rPr lang="en-GB" dirty="0"/>
+              <a:t>How is this different from visible consumption?</a:t>
+            </a:r>
+          </a:p>
+        </p:txBody>
+      </p:sp>
+      <p:sp>
+        <p:nvSpPr>
+          <p:cNvPr id="3" name="Content Placeholder 2">
+            <a:extLst>
+              <a:ext uri="{FF2B5EF4-FFF2-40B4-BE49-F238E27FC236}">
+                <a16:creationId xmlns:a16="http://schemas.microsoft.com/office/drawing/2014/main" id="{8E165D5A-616B-4E7A-B5B6-2C1A87ADB63C}"/>
+              </a:ext>
+            </a:extLst>
+          </p:cNvPr>
+          <p:cNvSpPr>
+            <a:spLocks noGrp="1"/>
+          </p:cNvSpPr>
+          <p:nvPr>
+            <p:ph idx="1"/>
+          </p:nvPr>
+        </p:nvSpPr>
+        <p:spPr>
+          <a:xfrm>
+            <a:off x="628650" y="1443038"/>
+            <a:ext cx="7886700" cy="3262312"/>
+          </a:xfrm>
+        </p:spPr>
+        <p:txBody>
+          <a:bodyPr>
+            <a:normAutofit/>
+          </a:bodyPr>
+          <a:lstStyle/>
+          <a:p>
+            <a:r>
+              <a:rPr lang="en-GB" dirty="0"/>
+              <a:t>The LSMS data shows many opportunities for visible consumption – e.g. marriage price, expenditure on carpets rugs – but there too the effect of urban-rural differences dominates</a:t>
+            </a:r>
+          </a:p>
+        </p:txBody>
+      </p:sp>
+      <p:sp>
+        <p:nvSpPr>
+          <p:cNvPr id="4" name="Slide Number Placeholder 3">
+            <a:extLst>
+              <a:ext uri="{FF2B5EF4-FFF2-40B4-BE49-F238E27FC236}">
+                <a16:creationId xmlns:a16="http://schemas.microsoft.com/office/drawing/2014/main" id="{DA097299-24FE-4400-A473-449518E30133}"/>
+              </a:ext>
+            </a:extLst>
+          </p:cNvPr>
+          <p:cNvSpPr>
+            <a:spLocks noGrp="1"/>
+          </p:cNvSpPr>
+          <p:nvPr>
+            <p:ph type="sldNum" sz="quarter" idx="12"/>
+          </p:nvPr>
+        </p:nvSpPr>
+        <p:spPr/>
+        <p:txBody>
+          <a:bodyPr/>
+          <a:lstStyle/>
+          <a:p>
+            <a:pPr>
+              <a:defRPr/>
+            </a:pPr>
+            <a:fld id="{8E35B453-7314-4BBD-9303-11C6BECC4B0D}" type="slidenum">
+              <a:rPr lang="en-GB" altLang="en-US" smtClean="0"/>
+              <a:pPr>
+                <a:defRPr/>
+              </a:pPr>
+              <a:t>16</a:t>
+            </a:fld>
+            <a:endParaRPr lang="en-GB" altLang="en-US" dirty="0"/>
+          </a:p>
+        </p:txBody>
+      </p:sp>
+    </p:spTree>
+    <p:extLst>
+      <p:ext uri="{BB962C8B-B14F-4D97-AF65-F5344CB8AC3E}">
+        <p14:creationId xmlns:p14="http://schemas.microsoft.com/office/powerpoint/2010/main" val="2952202664"/>
+      </p:ext>
+    </p:extLst>
+  </p:cSld>
+  <p:clrMapOvr>
+    <a:masterClrMapping/>
+  </p:clrMapOvr>
+  <p:transition>
+    <p:fade/>
+  </p:transition>
+</p:sld>
+</file>
+
+<file path=ppt/slides/slide17.xml><?xml version="1.0" encoding="utf-8"?>
+<p:sld xmlns:a="http://schemas.openxmlformats.org/drawingml/2006/main" xmlns:r="http://schemas.openxmlformats.org/officeDocument/2006/relationships" xmlns:p="http://schemas.openxmlformats.org/presentationml/2006/main">
+  <p:cSld>
+    <p:spTree>
+      <p:nvGrpSpPr>
+        <p:cNvPr id="1" name=""/>
+        <p:cNvGrpSpPr/>
+        <p:nvPr/>
+      </p:nvGrpSpPr>
+      <p:grpSpPr>
+        <a:xfrm>
+          <a:off x="0" y="0"/>
+          <a:ext cx="0" cy="0"/>
+          <a:chOff x="0" y="0"/>
+          <a:chExt cx="0" cy="0"/>
+        </a:xfrm>
+      </p:grpSpPr>
+      <p:sp>
+        <p:nvSpPr>
+          <p:cNvPr id="2" name="Title 1">
+            <a:extLst>
+              <a:ext uri="{FF2B5EF4-FFF2-40B4-BE49-F238E27FC236}">
                 <a16:creationId xmlns:a16="http://schemas.microsoft.com/office/drawing/2014/main" id="{5448C546-8FFD-446E-BDCF-98089415F8BE}"/>
               </a:ext>
             </a:extLst>
@@ -18797,7 +19079,7 @@
               <a:pPr>
                 <a:defRPr/>
               </a:pPr>
-              <a:t>15</a:t>
+              <a:t>17</a:t>
             </a:fld>
             <a:endParaRPr lang="en-GB" altLang="en-US" dirty="0"/>
           </a:p>

</xml_diff>

<commit_message>
Adding item codes for 2012 and 2015.
</commit_message>
<xml_diff>
--- a/consumption/presentationOct2021.pptx
+++ b/consumption/presentationOct2021.pptx
@@ -6,10 +6,10 @@
     <p:sldMasterId id="2147483669" r:id="rId2"/>
   </p:sldMasterIdLst>
   <p:notesMasterIdLst>
-    <p:notesMasterId r:id="rId20"/>
+    <p:notesMasterId r:id="rId21"/>
   </p:notesMasterIdLst>
   <p:handoutMasterIdLst>
-    <p:handoutMasterId r:id="rId21"/>
+    <p:handoutMasterId r:id="rId22"/>
   </p:handoutMasterIdLst>
   <p:sldIdLst>
     <p:sldId id="301" r:id="rId3"/>
@@ -24,46 +24,47 @@
     <p:sldId id="344" r:id="rId12"/>
     <p:sldId id="324" r:id="rId13"/>
     <p:sldId id="346" r:id="rId14"/>
-    <p:sldId id="343" r:id="rId15"/>
-    <p:sldId id="345" r:id="rId16"/>
-    <p:sldId id="347" r:id="rId17"/>
-    <p:sldId id="337" r:id="rId18"/>
-    <p:sldId id="320" r:id="rId19"/>
+    <p:sldId id="345" r:id="rId15"/>
+    <p:sldId id="348" r:id="rId16"/>
+    <p:sldId id="343" r:id="rId17"/>
+    <p:sldId id="347" r:id="rId18"/>
+    <p:sldId id="337" r:id="rId19"/>
+    <p:sldId id="320" r:id="rId20"/>
   </p:sldIdLst>
   <p:sldSz cx="9144000" cy="5143500" type="screen16x9"/>
   <p:notesSz cx="6718300" cy="9867900"/>
   <p:embeddedFontLst>
     <p:embeddedFont>
       <p:font typeface="Calibri" panose="020F0502020204030204" pitchFamily="34" charset="0"/>
-      <p:regular r:id="rId22"/>
-      <p:bold r:id="rId23"/>
-      <p:italic r:id="rId24"/>
-      <p:boldItalic r:id="rId25"/>
+      <p:regular r:id="rId23"/>
+      <p:bold r:id="rId24"/>
+      <p:italic r:id="rId25"/>
+      <p:boldItalic r:id="rId26"/>
     </p:embeddedFont>
     <p:embeddedFont>
       <p:font typeface="Calibri Light" panose="020F0302020204030204" pitchFamily="34" charset="0"/>
-      <p:regular r:id="rId26"/>
-      <p:italic r:id="rId27"/>
+      <p:regular r:id="rId27"/>
+      <p:italic r:id="rId28"/>
     </p:embeddedFont>
     <p:embeddedFont>
       <p:font typeface="Cambria Math" panose="02040503050406030204" pitchFamily="18" charset="0"/>
-      <p:regular r:id="rId28"/>
+      <p:regular r:id="rId29"/>
     </p:embeddedFont>
     <p:embeddedFont>
       <p:font typeface="Effra" panose="020B0604020202020204" charset="0"/>
-      <p:regular r:id="rId29"/>
-      <p:bold r:id="rId30"/>
-      <p:italic r:id="rId31"/>
-      <p:boldItalic r:id="rId32"/>
+      <p:regular r:id="rId30"/>
+      <p:bold r:id="rId31"/>
+      <p:italic r:id="rId32"/>
+      <p:boldItalic r:id="rId33"/>
     </p:embeddedFont>
     <p:embeddedFont>
       <p:font typeface="Effra Bold" panose="020B0604020202020204" charset="0"/>
-      <p:bold r:id="rId33"/>
+      <p:bold r:id="rId34"/>
     </p:embeddedFont>
     <p:embeddedFont>
       <p:font typeface="Effra Light" panose="020B0604020202020204" charset="0"/>
-      <p:regular r:id="rId34"/>
-      <p:italic r:id="rId35"/>
+      <p:regular r:id="rId35"/>
+      <p:italic r:id="rId36"/>
     </p:embeddedFont>
   </p:embeddedFontLst>
   <p:defaultTextStyle>
@@ -18345,7 +18346,7 @@
           <p:cNvPr id="2" name="Title 1">
             <a:extLst>
               <a:ext uri="{FF2B5EF4-FFF2-40B4-BE49-F238E27FC236}">
-                <a16:creationId xmlns:a16="http://schemas.microsoft.com/office/drawing/2014/main" id="{989358B1-5556-4A30-98FB-74368A91CAEB}"/>
+                <a16:creationId xmlns:a16="http://schemas.microsoft.com/office/drawing/2014/main" id="{4A1BD2F4-8715-4E89-B522-B7A6F86809E6}"/>
               </a:ext>
             </a:extLst>
           </p:cNvPr>
@@ -18371,60 +18372,10 @@
       </p:sp>
       <p:sp>
         <p:nvSpPr>
-          <p:cNvPr id="3" name="Content Placeholder 2">
-            <a:extLst>
-              <a:ext uri="{FF2B5EF4-FFF2-40B4-BE49-F238E27FC236}">
-                <a16:creationId xmlns:a16="http://schemas.microsoft.com/office/drawing/2014/main" id="{02175C54-1B0C-4324-BD87-0CFA546C49D9}"/>
-              </a:ext>
-            </a:extLst>
-          </p:cNvPr>
-          <p:cNvSpPr>
-            <a:spLocks noGrp="1"/>
-          </p:cNvSpPr>
-          <p:nvPr>
-            <p:ph idx="1"/>
-          </p:nvPr>
-        </p:nvSpPr>
-        <p:spPr/>
-        <p:txBody>
-          <a:bodyPr/>
-          <a:lstStyle/>
-          <a:p>
-            <a:r>
-              <a:rPr lang="en-GB" dirty="0"/>
-              <a:t>The non-parametric view of data shows vast differences in assets</a:t>
-            </a:r>
-          </a:p>
-          <a:p>
-            <a:r>
-              <a:rPr lang="en-GB" dirty="0"/>
-              <a:t>The overall role of occupation is strong in Tanzania</a:t>
-            </a:r>
-          </a:p>
-          <a:p>
-            <a:r>
-              <a:rPr lang="en-GB" dirty="0"/>
-              <a:t>Interestingly the subjective well being does not align with the asset distribution</a:t>
-            </a:r>
-          </a:p>
-          <a:p>
-            <a:pPr lvl="1"/>
-            <a:r>
-              <a:rPr lang="en-GB" dirty="0"/>
-              <a:t>The south and east of Tanzania are too far apart in assets and have incomparable amenities. This is less so in the central parts of </a:t>
-            </a:r>
-          </a:p>
-          <a:p>
-            <a:endParaRPr lang="en-GB" dirty="0"/>
-          </a:p>
-        </p:txBody>
-      </p:sp>
-      <p:sp>
-        <p:nvSpPr>
           <p:cNvPr id="4" name="Slide Number Placeholder 3">
             <a:extLst>
               <a:ext uri="{FF2B5EF4-FFF2-40B4-BE49-F238E27FC236}">
-                <a16:creationId xmlns:a16="http://schemas.microsoft.com/office/drawing/2014/main" id="{1FDD9C7A-6921-417D-A536-9A1ADE017F75}"/>
+                <a16:creationId xmlns:a16="http://schemas.microsoft.com/office/drawing/2014/main" id="{89065579-4D02-46AC-9555-391AF1EE3B68}"/>
               </a:ext>
             </a:extLst>
           </p:cNvPr>
@@ -18454,10 +18405,170 @@
           </a:p>
         </p:txBody>
       </p:sp>
+      <p:pic>
+        <p:nvPicPr>
+          <p:cNvPr id="9" name="Content Placeholder 8" descr="Chart, surface chart&#10;&#10;Description automatically generated">
+            <a:extLst>
+              <a:ext uri="{FF2B5EF4-FFF2-40B4-BE49-F238E27FC236}">
+                <a16:creationId xmlns:a16="http://schemas.microsoft.com/office/drawing/2014/main" id="{2F44EB68-6EAC-4D8A-A9BE-C188D8D96840}"/>
+              </a:ext>
+            </a:extLst>
+          </p:cNvPr>
+          <p:cNvPicPr>
+            <a:picLocks noGrp="1" noChangeAspect="1"/>
+          </p:cNvPicPr>
+          <p:nvPr>
+            <p:ph idx="1"/>
+          </p:nvPr>
+        </p:nvPicPr>
+        <p:blipFill>
+          <a:blip r:embed="rId2">
+            <a:extLst>
+              <a:ext uri="{28A0092B-C50C-407E-A947-70E740481C1C}">
+                <a14:useLocalDpi xmlns:a14="http://schemas.microsoft.com/office/drawing/2010/main" val="0"/>
+              </a:ext>
+            </a:extLst>
+          </a:blip>
+          <a:stretch>
+            <a:fillRect/>
+          </a:stretch>
+        </p:blipFill>
+        <p:spPr>
+          <a:xfrm>
+            <a:off x="5715000" y="1682057"/>
+            <a:ext cx="1997048" cy="1779386"/>
+          </a:xfrm>
+        </p:spPr>
+      </p:pic>
+      <p:sp>
+        <p:nvSpPr>
+          <p:cNvPr id="7" name="AutoShape 4">
+            <a:extLst>
+              <a:ext uri="{FF2B5EF4-FFF2-40B4-BE49-F238E27FC236}">
+                <a16:creationId xmlns:a16="http://schemas.microsoft.com/office/drawing/2014/main" id="{32DACF70-3526-48F7-B2CD-D876BD7A9E22}"/>
+              </a:ext>
+            </a:extLst>
+          </p:cNvPr>
+          <p:cNvSpPr>
+            <a:spLocks noChangeAspect="1" noChangeArrowheads="1"/>
+          </p:cNvSpPr>
+          <p:nvPr/>
+        </p:nvSpPr>
+        <p:spPr bwMode="auto">
+          <a:xfrm>
+            <a:off x="4419600" y="2419350"/>
+            <a:ext cx="304800" cy="304800"/>
+          </a:xfrm>
+          <a:prstGeom prst="rect">
+            <a:avLst/>
+          </a:prstGeom>
+          <a:noFill/>
+          <a:extLst>
+            <a:ext uri="{909E8E84-426E-40DD-AFC4-6F175D3DCCD1}">
+              <a14:hiddenFill xmlns:a14="http://schemas.microsoft.com/office/drawing/2010/main">
+                <a:solidFill>
+                  <a:srgbClr val="FFFFFF"/>
+                </a:solidFill>
+              </a14:hiddenFill>
+            </a:ext>
+          </a:extLst>
+        </p:spPr>
+        <p:txBody>
+          <a:bodyPr vert="horz" wrap="square" lIns="91440" tIns="45720" rIns="91440" bIns="45720" numCol="1" anchor="t" anchorCtr="0" compatLnSpc="1">
+            <a:prstTxWarp prst="textNoShape">
+              <a:avLst/>
+            </a:prstTxWarp>
+          </a:bodyPr>
+          <a:lstStyle/>
+          <a:p>
+            <a:endParaRPr lang="en-GB"/>
+          </a:p>
+        </p:txBody>
+      </p:sp>
+      <p:pic>
+        <p:nvPicPr>
+          <p:cNvPr id="11" name="Picture 10" descr="Chart, surface chart&#10;&#10;Description automatically generated">
+            <a:extLst>
+              <a:ext uri="{FF2B5EF4-FFF2-40B4-BE49-F238E27FC236}">
+                <a16:creationId xmlns:a16="http://schemas.microsoft.com/office/drawing/2014/main" id="{0F0EFEBC-031D-4E4E-863A-235E67A608EA}"/>
+              </a:ext>
+            </a:extLst>
+          </p:cNvPr>
+          <p:cNvPicPr>
+            <a:picLocks noChangeAspect="1"/>
+          </p:cNvPicPr>
+          <p:nvPr/>
+        </p:nvPicPr>
+        <p:blipFill>
+          <a:blip r:embed="rId3">
+            <a:extLst>
+              <a:ext uri="{28A0092B-C50C-407E-A947-70E740481C1C}">
+                <a14:useLocalDpi xmlns:a14="http://schemas.microsoft.com/office/drawing/2010/main" val="0"/>
+              </a:ext>
+            </a:extLst>
+          </a:blip>
+          <a:stretch>
+            <a:fillRect/>
+          </a:stretch>
+        </p:blipFill>
+        <p:spPr>
+          <a:xfrm>
+            <a:off x="1219200" y="2474291"/>
+            <a:ext cx="3550646" cy="2571750"/>
+          </a:xfrm>
+          <a:prstGeom prst="rect">
+            <a:avLst/>
+          </a:prstGeom>
+        </p:spPr>
+      </p:pic>
+      <p:sp>
+        <p:nvSpPr>
+          <p:cNvPr id="12" name="TextBox 11">
+            <a:extLst>
+              <a:ext uri="{FF2B5EF4-FFF2-40B4-BE49-F238E27FC236}">
+                <a16:creationId xmlns:a16="http://schemas.microsoft.com/office/drawing/2014/main" id="{DF4FC69C-10DC-455C-A3E3-A0D266968018}"/>
+              </a:ext>
+            </a:extLst>
+          </p:cNvPr>
+          <p:cNvSpPr txBox="1"/>
+          <p:nvPr/>
+        </p:nvSpPr>
+        <p:spPr>
+          <a:xfrm>
+            <a:off x="533400" y="1581150"/>
+            <a:ext cx="4700326" cy="1015663"/>
+          </a:xfrm>
+          <a:prstGeom prst="rect">
+            <a:avLst/>
+          </a:prstGeom>
+          <a:noFill/>
+        </p:spPr>
+        <p:txBody>
+          <a:bodyPr wrap="none" rtlCol="0">
+            <a:spAutoFit/>
+          </a:bodyPr>
+          <a:lstStyle/>
+          <a:p>
+            <a:r>
+              <a:rPr lang="en-US" dirty="0"/>
+              <a:t>Non-food expenditures are much higher</a:t>
+            </a:r>
+          </a:p>
+          <a:p>
+            <a:r>
+              <a:rPr lang="en-US" dirty="0"/>
+              <a:t>in the east of the country</a:t>
+            </a:r>
+          </a:p>
+          <a:p>
+            <a:endParaRPr lang="en-GB" dirty="0"/>
+          </a:p>
+        </p:txBody>
+      </p:sp>
     </p:spTree>
     <p:extLst>
       <p:ext uri="{BB962C8B-B14F-4D97-AF65-F5344CB8AC3E}">
-        <p14:creationId xmlns:p14="http://schemas.microsoft.com/office/powerpoint/2010/main" val="319899213"/>
+        <p14:creationId xmlns:p14="http://schemas.microsoft.com/office/powerpoint/2010/main" val="4201495867"/>
       </p:ext>
     </p:extLst>
   </p:cSld>
@@ -18492,7 +18603,7 @@
           <p:cNvPr id="2" name="Title 1">
             <a:extLst>
               <a:ext uri="{FF2B5EF4-FFF2-40B4-BE49-F238E27FC236}">
-                <a16:creationId xmlns:a16="http://schemas.microsoft.com/office/drawing/2014/main" id="{4A1BD2F4-8715-4E89-B522-B7A6F86809E6}"/>
+                <a16:creationId xmlns:a16="http://schemas.microsoft.com/office/drawing/2014/main" id="{59B711C6-2E3A-434D-BCD6-4260203D1E87}"/>
               </a:ext>
             </a:extLst>
           </p:cNvPr>
@@ -18509,10 +18620,10 @@
           <a:lstStyle/>
           <a:p>
             <a:r>
-              <a:rPr lang="en-US" dirty="0"/>
+              <a:rPr lang="en-US"/>
               <a:t>Nigeria</a:t>
             </a:r>
-            <a:endParaRPr lang="en-GB" dirty="0"/>
+            <a:endParaRPr lang="en-GB"/>
           </a:p>
         </p:txBody>
       </p:sp>
@@ -18521,7 +18632,7 @@
           <p:cNvPr id="3" name="Content Placeholder 2">
             <a:extLst>
               <a:ext uri="{FF2B5EF4-FFF2-40B4-BE49-F238E27FC236}">
-                <a16:creationId xmlns:a16="http://schemas.microsoft.com/office/drawing/2014/main" id="{B96724EB-89EA-49FA-8FB0-903EE257F67E}"/>
+                <a16:creationId xmlns:a16="http://schemas.microsoft.com/office/drawing/2014/main" id="{C5879A99-99CE-495B-AA5A-7A803F23F00E}"/>
               </a:ext>
             </a:extLst>
           </p:cNvPr>
@@ -18537,14 +18648,6 @@
           <a:bodyPr/>
           <a:lstStyle/>
           <a:p>
-            <a:r>
-              <a:rPr lang="en-US" dirty="0"/>
-              <a:t>The non-parametric plot </a:t>
-            </a:r>
-            <a:r>
-              <a:rPr lang="en-US"/>
-              <a:t>for Nigeria.</a:t>
-            </a:r>
             <a:endParaRPr lang="en-GB"/>
           </a:p>
         </p:txBody>
@@ -18554,7 +18657,7 @@
           <p:cNvPr id="4" name="Slide Number Placeholder 3">
             <a:extLst>
               <a:ext uri="{FF2B5EF4-FFF2-40B4-BE49-F238E27FC236}">
-                <a16:creationId xmlns:a16="http://schemas.microsoft.com/office/drawing/2014/main" id="{89065579-4D02-46AC-9555-391AF1EE3B68}"/>
+                <a16:creationId xmlns:a16="http://schemas.microsoft.com/office/drawing/2014/main" id="{232C6AE5-087E-444F-A88E-E5A926F229BF}"/>
               </a:ext>
             </a:extLst>
           </p:cNvPr>
@@ -18587,7 +18690,7 @@
     </p:spTree>
     <p:extLst>
       <p:ext uri="{BB962C8B-B14F-4D97-AF65-F5344CB8AC3E}">
-        <p14:creationId xmlns:p14="http://schemas.microsoft.com/office/powerpoint/2010/main" val="4201495867"/>
+        <p14:creationId xmlns:p14="http://schemas.microsoft.com/office/powerpoint/2010/main" val="100214087"/>
       </p:ext>
     </p:extLst>
   </p:cSld>
@@ -18622,7 +18725,7 @@
           <p:cNvPr id="2" name="Title 1">
             <a:extLst>
               <a:ext uri="{FF2B5EF4-FFF2-40B4-BE49-F238E27FC236}">
-                <a16:creationId xmlns:a16="http://schemas.microsoft.com/office/drawing/2014/main" id="{1E281EA7-B51E-4DC4-83AC-69973366C6BA}"/>
+                <a16:creationId xmlns:a16="http://schemas.microsoft.com/office/drawing/2014/main" id="{989358B1-5556-4A30-98FB-74368A91CAEB}"/>
               </a:ext>
             </a:extLst>
           </p:cNvPr>
@@ -18640,7 +18743,7 @@
           <a:p>
             <a:r>
               <a:rPr lang="en-US" dirty="0"/>
-              <a:t>Finer details with quantile regression</a:t>
+              <a:t>Tanzania</a:t>
             </a:r>
             <a:endParaRPr lang="en-GB" dirty="0"/>
           </a:p>
@@ -18651,7 +18754,7 @@
           <p:cNvPr id="3" name="Content Placeholder 2">
             <a:extLst>
               <a:ext uri="{FF2B5EF4-FFF2-40B4-BE49-F238E27FC236}">
-                <a16:creationId xmlns:a16="http://schemas.microsoft.com/office/drawing/2014/main" id="{5FB0481C-346A-45D5-BE87-16CD5476AF6A}"/>
+                <a16:creationId xmlns:a16="http://schemas.microsoft.com/office/drawing/2014/main" id="{02175C54-1B0C-4324-BD87-0CFA546C49D9}"/>
               </a:ext>
             </a:extLst>
           </p:cNvPr>
@@ -18668,16 +18771,31 @@
           <a:lstStyle/>
           <a:p>
             <a:r>
-              <a:rPr lang="en-US" dirty="0"/>
-              <a:t>Tanzania</a:t>
-            </a:r>
-          </a:p>
-          <a:p>
-            <a:r>
-              <a:rPr lang="en-US"/>
-              <a:t>Nigeria</a:t>
-            </a:r>
-            <a:endParaRPr lang="en-GB"/>
+              <a:rPr lang="en-GB" dirty="0"/>
+              <a:t>The non-parametric view of data shows vast differences in assets</a:t>
+            </a:r>
+          </a:p>
+          <a:p>
+            <a:r>
+              <a:rPr lang="en-GB" dirty="0"/>
+              <a:t>The overall role of occupation is strong in Tanzania</a:t>
+            </a:r>
+          </a:p>
+          <a:p>
+            <a:r>
+              <a:rPr lang="en-GB" dirty="0"/>
+              <a:t>Interestingly the subjective well being does not align with the asset distribution</a:t>
+            </a:r>
+          </a:p>
+          <a:p>
+            <a:pPr lvl="1"/>
+            <a:r>
+              <a:rPr lang="en-GB" dirty="0"/>
+              <a:t>The south and east of Tanzania are too far apart in assets and have incomparable amenities. This is less so in the central parts of </a:t>
+            </a:r>
+          </a:p>
+          <a:p>
+            <a:endParaRPr lang="en-GB" dirty="0"/>
           </a:p>
         </p:txBody>
       </p:sp>
@@ -18686,7 +18804,7 @@
           <p:cNvPr id="4" name="Slide Number Placeholder 3">
             <a:extLst>
               <a:ext uri="{FF2B5EF4-FFF2-40B4-BE49-F238E27FC236}">
-                <a16:creationId xmlns:a16="http://schemas.microsoft.com/office/drawing/2014/main" id="{AD7169C2-F41A-40EE-A210-49C6A0A94BEF}"/>
+                <a16:creationId xmlns:a16="http://schemas.microsoft.com/office/drawing/2014/main" id="{1FDD9C7A-6921-417D-A536-9A1ADE017F75}"/>
               </a:ext>
             </a:extLst>
           </p:cNvPr>
@@ -18719,7 +18837,7 @@
     </p:spTree>
     <p:extLst>
       <p:ext uri="{BB962C8B-B14F-4D97-AF65-F5344CB8AC3E}">
-        <p14:creationId xmlns:p14="http://schemas.microsoft.com/office/powerpoint/2010/main" val="3432941902"/>
+        <p14:creationId xmlns:p14="http://schemas.microsoft.com/office/powerpoint/2010/main" val="319899213"/>
       </p:ext>
     </p:extLst>
   </p:cSld>
@@ -18754,7 +18872,7 @@
           <p:cNvPr id="2" name="Title 1">
             <a:extLst>
               <a:ext uri="{FF2B5EF4-FFF2-40B4-BE49-F238E27FC236}">
-                <a16:creationId xmlns:a16="http://schemas.microsoft.com/office/drawing/2014/main" id="{0BFD862A-E2C5-4015-9F48-E21EBBEC1398}"/>
+                <a16:creationId xmlns:a16="http://schemas.microsoft.com/office/drawing/2014/main" id="{1E281EA7-B51E-4DC4-83AC-69973366C6BA}"/>
               </a:ext>
             </a:extLst>
           </p:cNvPr>
@@ -18771,9 +18889,10 @@
           <a:lstStyle/>
           <a:p>
             <a:r>
-              <a:rPr lang="en-GB" dirty="0"/>
-              <a:t>How is this different from visible consumption?</a:t>
-            </a:r>
+              <a:rPr lang="en-US" dirty="0"/>
+              <a:t>Finer details with quantile regression</a:t>
+            </a:r>
+            <a:endParaRPr lang="en-GB" dirty="0"/>
           </a:p>
         </p:txBody>
       </p:sp>
@@ -18782,7 +18901,7 @@
           <p:cNvPr id="3" name="Content Placeholder 2">
             <a:extLst>
               <a:ext uri="{FF2B5EF4-FFF2-40B4-BE49-F238E27FC236}">
-                <a16:creationId xmlns:a16="http://schemas.microsoft.com/office/drawing/2014/main" id="{8E165D5A-616B-4E7A-B5B6-2C1A87ADB63C}"/>
+                <a16:creationId xmlns:a16="http://schemas.microsoft.com/office/drawing/2014/main" id="{5FB0481C-346A-45D5-BE87-16CD5476AF6A}"/>
               </a:ext>
             </a:extLst>
           </p:cNvPr>
@@ -18793,22 +18912,22 @@
             <p:ph idx="1"/>
           </p:nvPr>
         </p:nvSpPr>
-        <p:spPr>
-          <a:xfrm>
-            <a:off x="628650" y="1443038"/>
-            <a:ext cx="7886700" cy="3262312"/>
-          </a:xfrm>
-        </p:spPr>
-        <p:txBody>
-          <a:bodyPr>
-            <a:normAutofit/>
-          </a:bodyPr>
+        <p:spPr/>
+        <p:txBody>
+          <a:bodyPr/>
           <a:lstStyle/>
           <a:p>
             <a:r>
-              <a:rPr lang="en-GB" dirty="0"/>
-              <a:t>The LSMS data shows many opportunities for visible consumption – e.g. marriage price, expenditure on carpets rugs – but there too the effect of urban-rural differences dominates</a:t>
-            </a:r>
+              <a:rPr lang="en-US" dirty="0"/>
+              <a:t>Tanzania</a:t>
+            </a:r>
+          </a:p>
+          <a:p>
+            <a:r>
+              <a:rPr lang="en-US" dirty="0"/>
+              <a:t>Nigeria</a:t>
+            </a:r>
+            <a:endParaRPr lang="en-GB" dirty="0"/>
           </a:p>
         </p:txBody>
       </p:sp>
@@ -18817,7 +18936,7 @@
           <p:cNvPr id="4" name="Slide Number Placeholder 3">
             <a:extLst>
               <a:ext uri="{FF2B5EF4-FFF2-40B4-BE49-F238E27FC236}">
-                <a16:creationId xmlns:a16="http://schemas.microsoft.com/office/drawing/2014/main" id="{DA097299-24FE-4400-A473-449518E30133}"/>
+                <a16:creationId xmlns:a16="http://schemas.microsoft.com/office/drawing/2014/main" id="{AD7169C2-F41A-40EE-A210-49C6A0A94BEF}"/>
               </a:ext>
             </a:extLst>
           </p:cNvPr>
@@ -18850,7 +18969,7 @@
     </p:spTree>
     <p:extLst>
       <p:ext uri="{BB962C8B-B14F-4D97-AF65-F5344CB8AC3E}">
-        <p14:creationId xmlns:p14="http://schemas.microsoft.com/office/powerpoint/2010/main" val="2952202664"/>
+        <p14:creationId xmlns:p14="http://schemas.microsoft.com/office/powerpoint/2010/main" val="3432941902"/>
       </p:ext>
     </p:extLst>
   </p:cSld>
@@ -18885,6 +19004,137 @@
           <p:cNvPr id="2" name="Title 1">
             <a:extLst>
               <a:ext uri="{FF2B5EF4-FFF2-40B4-BE49-F238E27FC236}">
+                <a16:creationId xmlns:a16="http://schemas.microsoft.com/office/drawing/2014/main" id="{0BFD862A-E2C5-4015-9F48-E21EBBEC1398}"/>
+              </a:ext>
+            </a:extLst>
+          </p:cNvPr>
+          <p:cNvSpPr>
+            <a:spLocks noGrp="1"/>
+          </p:cNvSpPr>
+          <p:nvPr>
+            <p:ph type="title"/>
+          </p:nvPr>
+        </p:nvSpPr>
+        <p:spPr/>
+        <p:txBody>
+          <a:bodyPr/>
+          <a:lstStyle/>
+          <a:p>
+            <a:r>
+              <a:rPr lang="en-GB" dirty="0"/>
+              <a:t>How is this different from visible consumption?</a:t>
+            </a:r>
+          </a:p>
+        </p:txBody>
+      </p:sp>
+      <p:sp>
+        <p:nvSpPr>
+          <p:cNvPr id="3" name="Content Placeholder 2">
+            <a:extLst>
+              <a:ext uri="{FF2B5EF4-FFF2-40B4-BE49-F238E27FC236}">
+                <a16:creationId xmlns:a16="http://schemas.microsoft.com/office/drawing/2014/main" id="{8E165D5A-616B-4E7A-B5B6-2C1A87ADB63C}"/>
+              </a:ext>
+            </a:extLst>
+          </p:cNvPr>
+          <p:cNvSpPr>
+            <a:spLocks noGrp="1"/>
+          </p:cNvSpPr>
+          <p:nvPr>
+            <p:ph idx="1"/>
+          </p:nvPr>
+        </p:nvSpPr>
+        <p:spPr>
+          <a:xfrm>
+            <a:off x="628650" y="1443038"/>
+            <a:ext cx="7886700" cy="3262312"/>
+          </a:xfrm>
+        </p:spPr>
+        <p:txBody>
+          <a:bodyPr>
+            <a:normAutofit/>
+          </a:bodyPr>
+          <a:lstStyle/>
+          <a:p>
+            <a:r>
+              <a:rPr lang="en-GB" dirty="0"/>
+              <a:t>The LSMS data shows many opportunities for visible consumption – e.g. marriage price, expenditure on carpets rugs – but there too the effect of urban-rural differences dominates</a:t>
+            </a:r>
+          </a:p>
+        </p:txBody>
+      </p:sp>
+      <p:sp>
+        <p:nvSpPr>
+          <p:cNvPr id="4" name="Slide Number Placeholder 3">
+            <a:extLst>
+              <a:ext uri="{FF2B5EF4-FFF2-40B4-BE49-F238E27FC236}">
+                <a16:creationId xmlns:a16="http://schemas.microsoft.com/office/drawing/2014/main" id="{DA097299-24FE-4400-A473-449518E30133}"/>
+              </a:ext>
+            </a:extLst>
+          </p:cNvPr>
+          <p:cNvSpPr>
+            <a:spLocks noGrp="1"/>
+          </p:cNvSpPr>
+          <p:nvPr>
+            <p:ph type="sldNum" sz="quarter" idx="12"/>
+          </p:nvPr>
+        </p:nvSpPr>
+        <p:spPr/>
+        <p:txBody>
+          <a:bodyPr/>
+          <a:lstStyle/>
+          <a:p>
+            <a:pPr>
+              <a:defRPr/>
+            </a:pPr>
+            <a:fld id="{8E35B453-7314-4BBD-9303-11C6BECC4B0D}" type="slidenum">
+              <a:rPr lang="en-GB" altLang="en-US" smtClean="0"/>
+              <a:pPr>
+                <a:defRPr/>
+              </a:pPr>
+              <a:t>17</a:t>
+            </a:fld>
+            <a:endParaRPr lang="en-GB" altLang="en-US" dirty="0"/>
+          </a:p>
+        </p:txBody>
+      </p:sp>
+    </p:spTree>
+    <p:extLst>
+      <p:ext uri="{BB962C8B-B14F-4D97-AF65-F5344CB8AC3E}">
+        <p14:creationId xmlns:p14="http://schemas.microsoft.com/office/powerpoint/2010/main" val="2952202664"/>
+      </p:ext>
+    </p:extLst>
+  </p:cSld>
+  <p:clrMapOvr>
+    <a:masterClrMapping/>
+  </p:clrMapOvr>
+  <p:transition>
+    <p:fade/>
+  </p:transition>
+</p:sld>
+</file>
+
+<file path=ppt/slides/slide18.xml><?xml version="1.0" encoding="utf-8"?>
+<p:sld xmlns:a="http://schemas.openxmlformats.org/drawingml/2006/main" xmlns:r="http://schemas.openxmlformats.org/officeDocument/2006/relationships" xmlns:p="http://schemas.openxmlformats.org/presentationml/2006/main">
+  <p:cSld>
+    <p:spTree>
+      <p:nvGrpSpPr>
+        <p:cNvPr id="1" name=""/>
+        <p:cNvGrpSpPr/>
+        <p:nvPr/>
+      </p:nvGrpSpPr>
+      <p:grpSpPr>
+        <a:xfrm>
+          <a:off x="0" y="0"/>
+          <a:ext cx="0" cy="0"/>
+          <a:chOff x="0" y="0"/>
+          <a:chExt cx="0" cy="0"/>
+        </a:xfrm>
+      </p:grpSpPr>
+      <p:sp>
+        <p:nvSpPr>
+          <p:cNvPr id="2" name="Title 1">
+            <a:extLst>
+              <a:ext uri="{FF2B5EF4-FFF2-40B4-BE49-F238E27FC236}">
                 <a16:creationId xmlns:a16="http://schemas.microsoft.com/office/drawing/2014/main" id="{5448C546-8FFD-446E-BDCF-98089415F8BE}"/>
               </a:ext>
             </a:extLst>
@@ -19079,7 +19329,7 @@
               <a:pPr>
                 <a:defRPr/>
               </a:pPr>
-              <a:t>17</a:t>
+              <a:t>18</a:t>
             </a:fld>
             <a:endParaRPr lang="en-GB" altLang="en-US" dirty="0"/>
           </a:p>

</xml_diff>

<commit_message>
Adding nigeria-expenditure-categories for 2012 and 2015.
</commit_message>
<xml_diff>
--- a/consumption/presentationOct2021.pptx
+++ b/consumption/presentationOct2021.pptx
@@ -18620,10 +18620,10 @@
           <a:lstStyle/>
           <a:p>
             <a:r>
-              <a:rPr lang="en-US"/>
+              <a:rPr lang="en-US" dirty="0"/>
               <a:t>Nigeria</a:t>
             </a:r>
-            <a:endParaRPr lang="en-GB"/>
+            <a:endParaRPr lang="en-GB" dirty="0"/>
           </a:p>
         </p:txBody>
       </p:sp>

</xml_diff>

<commit_message>
adding w_ne regression fields to tnz data.
</commit_message>
<xml_diff>
--- a/consumption/presentationOct2021.pptx
+++ b/consumption/presentationOct2021.pptx
@@ -6,10 +6,10 @@
     <p:sldMasterId id="2147483840" r:id="rId2"/>
   </p:sldMasterIdLst>
   <p:notesMasterIdLst>
-    <p:notesMasterId r:id="rId27"/>
+    <p:notesMasterId r:id="rId28"/>
   </p:notesMasterIdLst>
   <p:handoutMasterIdLst>
-    <p:handoutMasterId r:id="rId28"/>
+    <p:handoutMasterId r:id="rId29"/>
   </p:handoutMasterIdLst>
   <p:sldIdLst>
     <p:sldId id="301" r:id="rId3"/>
@@ -28,49 +28,50 @@
     <p:sldId id="348" r:id="rId16"/>
     <p:sldId id="349" r:id="rId17"/>
     <p:sldId id="350" r:id="rId18"/>
-    <p:sldId id="324" r:id="rId19"/>
+    <p:sldId id="356" r:id="rId19"/>
     <p:sldId id="343" r:id="rId20"/>
     <p:sldId id="353" r:id="rId21"/>
     <p:sldId id="347" r:id="rId22"/>
     <p:sldId id="354" r:id="rId23"/>
-    <p:sldId id="337" r:id="rId24"/>
-    <p:sldId id="351" r:id="rId25"/>
-    <p:sldId id="320" r:id="rId26"/>
+    <p:sldId id="324" r:id="rId24"/>
+    <p:sldId id="337" r:id="rId25"/>
+    <p:sldId id="351" r:id="rId26"/>
+    <p:sldId id="320" r:id="rId27"/>
   </p:sldIdLst>
   <p:sldSz cx="9144000" cy="5143500" type="screen16x9"/>
   <p:notesSz cx="6718300" cy="9867900"/>
   <p:embeddedFontLst>
     <p:embeddedFont>
       <p:font typeface="Calibri" panose="020F0502020204030204" pitchFamily="34" charset="0"/>
-      <p:regular r:id="rId29"/>
-      <p:bold r:id="rId30"/>
-      <p:italic r:id="rId31"/>
-      <p:boldItalic r:id="rId32"/>
+      <p:regular r:id="rId30"/>
+      <p:bold r:id="rId31"/>
+      <p:italic r:id="rId32"/>
+      <p:boldItalic r:id="rId33"/>
     </p:embeddedFont>
     <p:embeddedFont>
       <p:font typeface="Calibri Light" panose="020F0302020204030204" pitchFamily="34" charset="0"/>
-      <p:regular r:id="rId33"/>
-      <p:italic r:id="rId34"/>
+      <p:regular r:id="rId34"/>
+      <p:italic r:id="rId35"/>
     </p:embeddedFont>
     <p:embeddedFont>
       <p:font typeface="Cambria Math" panose="02040503050406030204" pitchFamily="18" charset="0"/>
-      <p:regular r:id="rId35"/>
+      <p:regular r:id="rId36"/>
     </p:embeddedFont>
     <p:embeddedFont>
       <p:font typeface="Effra" panose="020B0604020202020204" charset="0"/>
-      <p:regular r:id="rId36"/>
-      <p:bold r:id="rId37"/>
-      <p:italic r:id="rId38"/>
-      <p:boldItalic r:id="rId39"/>
+      <p:regular r:id="rId37"/>
+      <p:bold r:id="rId38"/>
+      <p:italic r:id="rId39"/>
+      <p:boldItalic r:id="rId40"/>
     </p:embeddedFont>
     <p:embeddedFont>
       <p:font typeface="Effra Bold" panose="020B0604020202020204" charset="0"/>
-      <p:bold r:id="rId40"/>
+      <p:bold r:id="rId41"/>
     </p:embeddedFont>
     <p:embeddedFont>
       <p:font typeface="Effra Light" panose="020B0604020202020204" charset="0"/>
-      <p:regular r:id="rId41"/>
-      <p:italic r:id="rId42"/>
+      <p:regular r:id="rId42"/>
+      <p:italic r:id="rId43"/>
     </p:embeddedFont>
   </p:embeddedFontLst>
   <p:defaultTextStyle>
@@ -7502,7 +7503,7 @@
               <a:pPr>
                 <a:defRPr/>
               </a:pPr>
-              <a:t>10/22/2021</a:t>
+              <a:t>10/23/2021</a:t>
             </a:fld>
             <a:endParaRPr lang="en-US" altLang="en-US"/>
           </a:p>
@@ -7943,7 +7944,7 @@
               <a:pPr>
                 <a:defRPr/>
               </a:pPr>
-              <a:t>10/22/2021</a:t>
+              <a:t>10/23/2021</a:t>
             </a:fld>
             <a:endParaRPr lang="en-US" altLang="en-US"/>
           </a:p>
@@ -8172,7 +8173,7 @@
               <a:pPr>
                 <a:defRPr/>
               </a:pPr>
-              <a:t>10/22/2021</a:t>
+              <a:t>10/23/2021</a:t>
             </a:fld>
             <a:endParaRPr lang="en-US" altLang="en-US"/>
           </a:p>
@@ -8361,7 +8362,7 @@
               <a:pPr>
                 <a:defRPr/>
               </a:pPr>
-              <a:t>10/22/2021</a:t>
+              <a:t>10/23/2021</a:t>
             </a:fld>
             <a:endParaRPr lang="en-US"/>
           </a:p>
@@ -8625,7 +8626,7 @@
               <a:pPr>
                 <a:defRPr/>
               </a:pPr>
-              <a:t>10/22/2021</a:t>
+              <a:t>10/23/2021</a:t>
             </a:fld>
             <a:endParaRPr lang="en-US"/>
           </a:p>
@@ -8876,7 +8877,7 @@
               <a:pPr>
                 <a:defRPr/>
               </a:pPr>
-              <a:t>10/22/2021</a:t>
+              <a:t>10/23/2021</a:t>
             </a:fld>
             <a:endParaRPr lang="en-US" altLang="en-US"/>
           </a:p>
@@ -9262,7 +9263,7 @@
               <a:pPr>
                 <a:defRPr/>
               </a:pPr>
-              <a:t>10/22/2021</a:t>
+              <a:t>10/23/2021</a:t>
             </a:fld>
             <a:endParaRPr lang="en-US"/>
           </a:p>
@@ -9399,7 +9400,7 @@
               <a:pPr>
                 <a:defRPr/>
               </a:pPr>
-              <a:t>10/22/2021</a:t>
+              <a:t>10/23/2021</a:t>
             </a:fld>
             <a:endParaRPr lang="en-US"/>
           </a:p>
@@ -9513,7 +9514,7 @@
               <a:pPr>
                 <a:defRPr/>
               </a:pPr>
-              <a:t>10/22/2021</a:t>
+              <a:t>10/23/2021</a:t>
             </a:fld>
             <a:endParaRPr lang="en-US"/>
           </a:p>
@@ -9809,7 +9810,7 @@
               <a:pPr>
                 <a:defRPr/>
               </a:pPr>
-              <a:t>10/22/2021</a:t>
+              <a:t>10/23/2021</a:t>
             </a:fld>
             <a:endParaRPr lang="en-US"/>
           </a:p>
@@ -10085,7 +10086,7 @@
               <a:pPr>
                 <a:defRPr/>
               </a:pPr>
-              <a:t>10/22/2021</a:t>
+              <a:t>10/23/2021</a:t>
             </a:fld>
             <a:endParaRPr lang="en-US"/>
           </a:p>
@@ -11513,7 +11514,7 @@
               <a:pPr>
                 <a:defRPr/>
               </a:pPr>
-              <a:t>10/22/2021</a:t>
+              <a:t>10/23/2021</a:t>
             </a:fld>
             <a:endParaRPr lang="en-US"/>
           </a:p>
@@ -11712,7 +11713,7 @@
               <a:pPr>
                 <a:defRPr/>
               </a:pPr>
-              <a:t>10/22/2021</a:t>
+              <a:t>10/23/2021</a:t>
             </a:fld>
             <a:endParaRPr lang="en-US"/>
           </a:p>
@@ -16071,7 +16072,7 @@
           <a:p>
             <a:fld id="{C764DE79-268F-4C1A-8933-263129D2AF90}" type="datetimeFigureOut">
               <a:rPr lang="en-US" dirty="0"/>
-              <a:t>10/22/2021</a:t>
+              <a:t>10/23/2021</a:t>
             </a:fld>
             <a:endParaRPr lang="en-US" dirty="0"/>
           </a:p>
@@ -16876,7 +16877,7 @@
             <p:spPr/>
             <p:txBody>
               <a:bodyPr>
-                <a:normAutofit fontScale="62500" lnSpcReduction="20000"/>
+                <a:normAutofit fontScale="70000" lnSpcReduction="20000"/>
               </a:bodyPr>
               <a:lstStyle/>
               <a:p>
@@ -16910,12 +16911,6 @@
                 <a:r>
                   <a:rPr lang="en-GB" dirty="0"/>
                   <a:t>Claim 2: Fulfilment of minimum needs carries no status-advantage</a:t>
-                </a:r>
-              </a:p>
-              <a:p>
-                <a:r>
-                  <a:rPr lang="en-GB" dirty="0"/>
-                  <a:t>The above can now be integrated in an intertemporal substitution framework</a:t>
                 </a:r>
               </a:p>
               <a:p>
@@ -17560,7 +17555,7 @@
               <a:blipFill>
                 <a:blip r:embed="rId2"/>
                 <a:stretch>
-                  <a:fillRect t="-1682"/>
+                  <a:fillRect l="-232" t="-2243" b="-1308"/>
                 </a:stretch>
               </a:blipFill>
             </p:spPr>
@@ -17709,8 +17704,8 @@
           </a:p>
         </p:txBody>
       </p:sp>
-      <mc:AlternateContent xmlns:mc="http://schemas.openxmlformats.org/markup-compatibility/2006">
-        <mc:Choice xmlns:a14="http://schemas.microsoft.com/office/drawing/2010/main" Requires="a14">
+      <mc:AlternateContent xmlns:mc="http://schemas.openxmlformats.org/markup-compatibility/2006" xmlns:a14="http://schemas.microsoft.com/office/drawing/2010/main">
+        <mc:Choice Requires="a14">
           <p:sp>
             <p:nvSpPr>
               <p:cNvPr id="3" name="Content Placeholder 2">
@@ -18597,7 +18592,7 @@
             </p:txBody>
           </p:sp>
         </mc:Choice>
-        <mc:Fallback>
+        <mc:Fallback xmlns="">
           <p:sp>
             <p:nvSpPr>
               <p:cNvPr id="3" name="Content Placeholder 2">
@@ -19198,7 +19193,7 @@
         <p:spPr>
           <a:xfrm>
             <a:off x="381000" y="1259604"/>
-            <a:ext cx="5787546" cy="1323439"/>
+            <a:ext cx="6076950" cy="1631216"/>
           </a:xfrm>
           <a:prstGeom prst="rect">
             <a:avLst/>
@@ -19206,7 +19201,7 @@
           <a:noFill/>
         </p:spPr>
         <p:txBody>
-          <a:bodyPr wrap="none" rtlCol="0">
+          <a:bodyPr wrap="square" rtlCol="0">
             <a:spAutoFit/>
           </a:bodyPr>
           <a:lstStyle/>
@@ -19233,7 +19228,7 @@
             </a:pPr>
             <a:r>
               <a:rPr lang="en-US" dirty="0"/>
-              <a:t>Vast asset differences exist across the country</a:t>
+              <a:t>Vast differences in asset ownership across the country</a:t>
             </a:r>
           </a:p>
           <a:p>
@@ -19626,28 +19621,28 @@
             <a:pPr lvl="1"/>
             <a:r>
               <a:rPr lang="en-GB" dirty="0"/>
-              <a:t>The non-parametric view of data shows vast differences in assets</a:t>
+              <a:t>There are vast differences in assets</a:t>
             </a:r>
           </a:p>
           <a:p>
             <a:pPr lvl="1"/>
             <a:r>
               <a:rPr lang="en-GB" dirty="0"/>
-              <a:t>The overall role of occupation is strong in Tanzania</a:t>
+              <a:t>Occupational differences across regions are high </a:t>
             </a:r>
           </a:p>
           <a:p>
             <a:pPr lvl="1"/>
             <a:r>
               <a:rPr lang="en-GB" dirty="0"/>
-              <a:t>The south and east of Tanzania are too far apart in assets and have incomparable amenities. This is less so in the central parts of </a:t>
+              <a:t>The south and east of Tanzania are too far apart in assets and have incomparable amenities. This is less so in the central parts.</a:t>
             </a:r>
           </a:p>
           <a:p>
             <a:pPr lvl="1"/>
             <a:r>
               <a:rPr lang="en-GB" dirty="0"/>
-              <a:t>The subjective well being does not align with the asset distribution</a:t>
+              <a:t>The subjective well being does not align with the asset distribution.</a:t>
             </a:r>
           </a:p>
           <a:p>
@@ -19667,8 +19662,19 @@
             <a:pPr lvl="1"/>
             <a:r>
               <a:rPr lang="en-GB" dirty="0"/>
-              <a:t>The role of occupation</a:t>
-            </a:r>
+              <a:t>The role of education is also significant</a:t>
+            </a:r>
+          </a:p>
+          <a:p>
+            <a:pPr lvl="1"/>
+            <a:r>
+              <a:rPr lang="en-GB" dirty="0"/>
+              <a:t>Occupational differences more uniform across regions</a:t>
+            </a:r>
+          </a:p>
+          <a:p>
+            <a:pPr lvl="1"/>
+            <a:endParaRPr lang="en-GB" dirty="0"/>
           </a:p>
         </p:txBody>
       </p:sp>
@@ -19803,41 +19809,296 @@
           </a:p>
         </p:txBody>
       </p:sp>
-      <p:sp>
-        <p:nvSpPr>
-          <p:cNvPr id="3" name="Content Placeholder 2">
-            <a:extLst>
-              <a:ext uri="{FF2B5EF4-FFF2-40B4-BE49-F238E27FC236}">
-                <a16:creationId xmlns:a16="http://schemas.microsoft.com/office/drawing/2014/main" id="{9182EAC1-F444-4637-9CC5-DE39E6E187B0}"/>
-              </a:ext>
-            </a:extLst>
-          </p:cNvPr>
-          <p:cNvSpPr>
-            <a:spLocks noGrp="1"/>
-          </p:cNvSpPr>
-          <p:nvPr>
-            <p:ph idx="1"/>
-          </p:nvPr>
-        </p:nvSpPr>
-        <p:spPr/>
-        <p:txBody>
-          <a:bodyPr/>
-          <a:lstStyle/>
-          <a:p>
-            <a:r>
-              <a:rPr lang="en-US" dirty="0"/>
-              <a:t>Basic Model</a:t>
-            </a:r>
-          </a:p>
-          <a:p>
-            <a:r>
-              <a:rPr lang="en-US" dirty="0"/>
-              <a:t>Quantile Regression</a:t>
-            </a:r>
-            <a:endParaRPr lang="en-GB" dirty="0"/>
-          </a:p>
-        </p:txBody>
-      </p:sp>
+      <mc:AlternateContent xmlns:mc="http://schemas.openxmlformats.org/markup-compatibility/2006">
+        <mc:Choice xmlns:a14="http://schemas.microsoft.com/office/drawing/2010/main" Requires="a14">
+          <p:sp>
+            <p:nvSpPr>
+              <p:cNvPr id="3" name="Content Placeholder 2">
+                <a:extLst>
+                  <a:ext uri="{FF2B5EF4-FFF2-40B4-BE49-F238E27FC236}">
+                    <a16:creationId xmlns:a16="http://schemas.microsoft.com/office/drawing/2014/main" id="{9182EAC1-F444-4637-9CC5-DE39E6E187B0}"/>
+                  </a:ext>
+                </a:extLst>
+              </p:cNvPr>
+              <p:cNvSpPr>
+                <a:spLocks noGrp="1"/>
+              </p:cNvSpPr>
+              <p:nvPr>
+                <p:ph idx="1"/>
+              </p:nvPr>
+            </p:nvSpPr>
+            <p:spPr/>
+            <p:txBody>
+              <a:bodyPr/>
+              <a:lstStyle/>
+              <a:p>
+                <a:r>
+                  <a:rPr lang="en-US" dirty="0"/>
+                  <a:t>Basic Model</a:t>
+                </a:r>
+              </a:p>
+              <a:p>
+                <a:pPr lvl="1"/>
+                <a:r>
+                  <a:rPr lang="en-US" dirty="0"/>
+                  <a:t>Independent Variable</a:t>
+                </a:r>
+              </a:p>
+              <a:p>
+                <a:pPr lvl="2"/>
+                <a14:m>
+                  <m:oMath xmlns:m="http://schemas.openxmlformats.org/officeDocument/2006/math">
+                    <m:sSub>
+                      <m:sSubPr>
+                        <m:ctrlPr>
+                          <a:rPr lang="en-US" b="0" i="1" smtClean="0">
+                            <a:latin typeface="Cambria Math" panose="02040503050406030204" pitchFamily="18" charset="0"/>
+                          </a:rPr>
+                        </m:ctrlPr>
+                      </m:sSubPr>
+                      <m:e>
+                        <m:r>
+                          <a:rPr lang="en-US" b="0" i="1" smtClean="0">
+                            <a:latin typeface="Cambria Math" panose="02040503050406030204" pitchFamily="18" charset="0"/>
+                          </a:rPr>
+                          <m:t>𝑤</m:t>
+                        </m:r>
+                      </m:e>
+                      <m:sub>
+                        <m:r>
+                          <a:rPr lang="en-US" b="0" i="1" smtClean="0">
+                            <a:latin typeface="Cambria Math" panose="02040503050406030204" pitchFamily="18" charset="0"/>
+                          </a:rPr>
+                          <m:t>𝑛𝑒</m:t>
+                        </m:r>
+                      </m:sub>
+                    </m:sSub>
+                  </m:oMath>
+                </a14:m>
+                <a:r>
+                  <a:rPr lang="en-US" dirty="0"/>
+                  <a:t> - the budget share of food and other non-durable consumption </a:t>
+                </a:r>
+              </a:p>
+              <a:p>
+                <a:pPr lvl="1"/>
+                <a:r>
+                  <a:rPr lang="en-US" dirty="0"/>
+                  <a:t>Dependent (Control) Variables</a:t>
+                </a:r>
+              </a:p>
+              <a:p>
+                <a:pPr lvl="2"/>
+                <a14:m>
+                  <m:oMath xmlns:m="http://schemas.openxmlformats.org/officeDocument/2006/math">
+                    <m:r>
+                      <m:rPr>
+                        <m:sty m:val="p"/>
+                      </m:rPr>
+                      <a:rPr lang="en-US" b="0" i="0" smtClean="0">
+                        <a:latin typeface="Cambria Math" panose="02040503050406030204" pitchFamily="18" charset="0"/>
+                      </a:rPr>
+                      <m:t>log</m:t>
+                    </m:r>
+                    <m:r>
+                      <a:rPr lang="en-US" b="0" i="1" smtClean="0">
+                        <a:latin typeface="Cambria Math" panose="02040503050406030204" pitchFamily="18" charset="0"/>
+                      </a:rPr>
+                      <m:t>⁡(</m:t>
+                    </m:r>
+                    <m:r>
+                      <a:rPr lang="en-US" b="0" i="1" smtClean="0">
+                        <a:latin typeface="Cambria Math" panose="02040503050406030204" pitchFamily="18" charset="0"/>
+                      </a:rPr>
+                      <m:t>𝑥</m:t>
+                    </m:r>
+                    <m:r>
+                      <a:rPr lang="en-US" b="0" i="1" smtClean="0">
+                        <a:latin typeface="Cambria Math" panose="02040503050406030204" pitchFamily="18" charset="0"/>
+                      </a:rPr>
+                      <m:t>)</m:t>
+                    </m:r>
+                  </m:oMath>
+                </a14:m>
+                <a:r>
+                  <a:rPr lang="en-US" dirty="0"/>
+                  <a:t> - </a:t>
+                </a:r>
+                <a14:m>
+                  <m:oMath xmlns:m="http://schemas.openxmlformats.org/officeDocument/2006/math">
+                    <m:r>
+                      <a:rPr lang="en-US" b="0" i="1" smtClean="0">
+                        <a:latin typeface="Cambria Math" panose="02040503050406030204" pitchFamily="18" charset="0"/>
+                      </a:rPr>
+                      <m:t>𝑥</m:t>
+                    </m:r>
+                  </m:oMath>
+                </a14:m>
+                <a:r>
+                  <a:rPr lang="en-US" dirty="0"/>
+                  <a:t> is the sum of asset costs and the non-durable consumption inclusive of food</a:t>
+                </a:r>
+              </a:p>
+              <a:p>
+                <a:pPr lvl="2"/>
+                <a14:m>
+                  <m:oMath xmlns:m="http://schemas.openxmlformats.org/officeDocument/2006/math">
+                    <m:sSub>
+                      <m:sSubPr>
+                        <m:ctrlPr>
+                          <a:rPr lang="en-US" b="0" i="1" smtClean="0">
+                            <a:latin typeface="Cambria Math" panose="02040503050406030204" pitchFamily="18" charset="0"/>
+                          </a:rPr>
+                        </m:ctrlPr>
+                      </m:sSubPr>
+                      <m:e>
+                        <m:r>
+                          <a:rPr lang="en-US" b="0" i="1" smtClean="0">
+                            <a:latin typeface="Cambria Math" panose="02040503050406030204" pitchFamily="18" charset="0"/>
+                          </a:rPr>
+                          <m:t>𝑟</m:t>
+                        </m:r>
+                      </m:e>
+                      <m:sub>
+                        <m:r>
+                          <a:rPr lang="en-US" b="0" i="1" smtClean="0">
+                            <a:latin typeface="Cambria Math" panose="02040503050406030204" pitchFamily="18" charset="0"/>
+                          </a:rPr>
+                          <m:t>𝑡</m:t>
+                        </m:r>
+                      </m:sub>
+                    </m:sSub>
+                  </m:oMath>
+                </a14:m>
+                <a:r>
+                  <a:rPr lang="en-US" dirty="0"/>
+                  <a:t> - logarithm of mean asset values in the </a:t>
+                </a:r>
+                <a14:m>
+                  <m:oMath xmlns:m="http://schemas.openxmlformats.org/officeDocument/2006/math">
+                    <m:r>
+                      <a:rPr lang="en-US" i="1">
+                        <a:latin typeface="Cambria Math" panose="02040503050406030204" pitchFamily="18" charset="0"/>
+                      </a:rPr>
+                      <m:t>4 </m:t>
+                    </m:r>
+                    <m:r>
+                      <a:rPr lang="en-US" b="0" i="1" smtClean="0">
+                        <a:latin typeface="Cambria Math" panose="02040503050406030204" pitchFamily="18" charset="0"/>
+                      </a:rPr>
+                      <m:t>𝑘</m:t>
+                    </m:r>
+                    <m:sSup>
+                      <m:sSupPr>
+                        <m:ctrlPr>
+                          <a:rPr lang="en-US" b="0" i="1" smtClean="0">
+                            <a:latin typeface="Cambria Math" panose="02040503050406030204" pitchFamily="18" charset="0"/>
+                          </a:rPr>
+                        </m:ctrlPr>
+                      </m:sSupPr>
+                      <m:e>
+                        <m:r>
+                          <a:rPr lang="en-US" b="0" i="1" smtClean="0">
+                            <a:latin typeface="Cambria Math" panose="02040503050406030204" pitchFamily="18" charset="0"/>
+                          </a:rPr>
+                          <m:t>𝑚</m:t>
+                        </m:r>
+                      </m:e>
+                      <m:sup>
+                        <m:r>
+                          <a:rPr lang="en-US" b="0" i="1" smtClean="0">
+                            <a:latin typeface="Cambria Math" panose="02040503050406030204" pitchFamily="18" charset="0"/>
+                          </a:rPr>
+                          <m:t>2</m:t>
+                        </m:r>
+                      </m:sup>
+                    </m:sSup>
+                  </m:oMath>
+                </a14:m>
+                <a:r>
+                  <a:rPr lang="en-US" dirty="0"/>
+                  <a:t> area around the consumer’s district</a:t>
+                </a:r>
+              </a:p>
+              <a:p>
+                <a:pPr lvl="2"/>
+                <a14:m>
+                  <m:oMath xmlns:m="http://schemas.openxmlformats.org/officeDocument/2006/math">
+                    <m:sSub>
+                      <m:sSubPr>
+                        <m:ctrlPr>
+                          <a:rPr lang="en-US" b="0" i="1" smtClean="0">
+                            <a:latin typeface="Cambria Math" panose="02040503050406030204" pitchFamily="18" charset="0"/>
+                          </a:rPr>
+                        </m:ctrlPr>
+                      </m:sSubPr>
+                      <m:e>
+                        <m:r>
+                          <a:rPr lang="en-US" b="0" i="1" smtClean="0">
+                            <a:latin typeface="Cambria Math" panose="02040503050406030204" pitchFamily="18" charset="0"/>
+                          </a:rPr>
+                          <m:t>𝑝</m:t>
+                        </m:r>
+                      </m:e>
+                      <m:sub>
+                        <m:r>
+                          <a:rPr lang="en-US" b="0" i="1" smtClean="0">
+                            <a:latin typeface="Cambria Math" panose="02040503050406030204" pitchFamily="18" charset="0"/>
+                          </a:rPr>
+                          <m:t>𝑛𝑒𝑒𝑑𝑠</m:t>
+                        </m:r>
+                      </m:sub>
+                    </m:sSub>
+                  </m:oMath>
+                </a14:m>
+                <a:r>
+                  <a:rPr lang="en-US" dirty="0"/>
+                  <a:t> - inferred as the average cost-per-head of non-durable consumption inclusive of food</a:t>
+                </a:r>
+              </a:p>
+            </p:txBody>
+          </p:sp>
+        </mc:Choice>
+        <mc:Fallback>
+          <p:sp>
+            <p:nvSpPr>
+              <p:cNvPr id="3" name="Content Placeholder 2">
+                <a:extLst>
+                  <a:ext uri="{FF2B5EF4-FFF2-40B4-BE49-F238E27FC236}">
+                    <a16:creationId xmlns:a16="http://schemas.microsoft.com/office/drawing/2014/main" id="{9182EAC1-F444-4637-9CC5-DE39E6E187B0}"/>
+                  </a:ext>
+                </a:extLst>
+              </p:cNvPr>
+              <p:cNvSpPr>
+                <a:spLocks noGrp="1" noRot="1" noChangeAspect="1" noMove="1" noResize="1" noEditPoints="1" noAdjustHandles="1" noChangeArrowheads="1" noChangeShapeType="1" noTextEdit="1"/>
+              </p:cNvSpPr>
+              <p:nvPr>
+                <p:ph idx="1"/>
+              </p:nvPr>
+            </p:nvSpPr>
+            <p:spPr>
+              <a:blipFill>
+                <a:blip r:embed="rId2"/>
+                <a:stretch>
+                  <a:fillRect l="-773" t="-2243"/>
+                </a:stretch>
+              </a:blipFill>
+            </p:spPr>
+            <p:txBody>
+              <a:bodyPr/>
+              <a:lstStyle/>
+              <a:p>
+                <a:r>
+                  <a:rPr lang="en-GB">
+                    <a:noFill/>
+                  </a:rPr>
+                  <a:t> </a:t>
+                </a:r>
+              </a:p>
+            </p:txBody>
+          </p:sp>
+        </mc:Fallback>
+      </mc:AlternateContent>
       <p:sp>
         <p:nvSpPr>
           <p:cNvPr id="4" name="Slide Number Placeholder 3">
@@ -19896,13 +20157,13 @@
       <p:bgPr>
         <a:gradFill>
           <a:gsLst>
-            <a:gs pos="20000">
+            <a:gs pos="0">
               <a:schemeClr val="accent1">
                 <a:lumMod val="5000"/>
                 <a:lumOff val="95000"/>
               </a:schemeClr>
             </a:gs>
-            <a:gs pos="55000">
+            <a:gs pos="74000">
               <a:schemeClr val="accent1">
                 <a:lumMod val="45000"/>
                 <a:lumOff val="55000"/>
@@ -19945,7 +20206,7 @@
           <p:cNvPr id="2" name="Title 1">
             <a:extLst>
               <a:ext uri="{FF2B5EF4-FFF2-40B4-BE49-F238E27FC236}">
-                <a16:creationId xmlns:a16="http://schemas.microsoft.com/office/drawing/2014/main" id="{34E1DDED-AC9A-4208-A7A3-ED93E965CB62}"/>
+                <a16:creationId xmlns:a16="http://schemas.microsoft.com/office/drawing/2014/main" id="{05C9031C-2123-4FF1-BCC7-6F2D113AFB0F}"/>
               </a:ext>
             </a:extLst>
           </p:cNvPr>
@@ -19962,9 +20223,10 @@
           <a:lstStyle/>
           <a:p>
             <a:r>
-              <a:rPr lang="en-GB" dirty="0"/>
-              <a:t>Classification of items</a:t>
-            </a:r>
+              <a:rPr lang="en-US" dirty="0"/>
+              <a:t>Parametric Analysis (contd.)</a:t>
+            </a:r>
+            <a:endParaRPr lang="en-GB" dirty="0"/>
           </a:p>
         </p:txBody>
       </p:sp>
@@ -19973,7 +20235,7 @@
           <p:cNvPr id="3" name="Content Placeholder 2">
             <a:extLst>
               <a:ext uri="{FF2B5EF4-FFF2-40B4-BE49-F238E27FC236}">
-                <a16:creationId xmlns:a16="http://schemas.microsoft.com/office/drawing/2014/main" id="{6C9C9E65-D10B-4CD2-BE37-9B781D7440F9}"/>
+                <a16:creationId xmlns:a16="http://schemas.microsoft.com/office/drawing/2014/main" id="{9182EAC1-F444-4637-9CC5-DE39E6E187B0}"/>
               </a:ext>
             </a:extLst>
           </p:cNvPr>
@@ -19986,36 +20248,13 @@
         </p:nvSpPr>
         <p:spPr/>
         <p:txBody>
-          <a:bodyPr>
-            <a:normAutofit/>
-          </a:bodyPr>
+          <a:bodyPr/>
           <a:lstStyle/>
           <a:p>
             <a:r>
-              <a:rPr lang="en-GB" dirty="0"/>
-              <a:t>We attempt to look at how excess non-durable consumption varies across durable goods possession levels </a:t>
-            </a:r>
-          </a:p>
-          <a:p>
-            <a:r>
-              <a:rPr lang="en-GB" dirty="0"/>
-              <a:t>Local non-durable consumption is relative to local </a:t>
-            </a:r>
-          </a:p>
-          <a:p>
-            <a:r>
-              <a:rPr lang="en-GB" dirty="0"/>
-              <a:t>A necessary implication of the model is that consumers with both lower durable consumption and lower relative excess cannot compete with the consumer for whom both are higher </a:t>
-            </a:r>
-          </a:p>
-          <a:p>
-            <a:r>
-              <a:rPr lang="en-GB" dirty="0"/>
-              <a:t>The framework can be easily extended to other economies – because of surveying difference economies – we rely only on excluding asset costs from non-durable consumption</a:t>
-            </a:r>
-          </a:p>
-          <a:p>
-            <a:endParaRPr lang="en-GB" dirty="0"/>
+              <a:rPr lang="en-US" dirty="0"/>
+              <a:t>Comparing the effects of average local cost and average asset-richness</a:t>
+            </a:r>
           </a:p>
         </p:txBody>
       </p:sp>
@@ -20024,7 +20263,7 @@
           <p:cNvPr id="4" name="Slide Number Placeholder 3">
             <a:extLst>
               <a:ext uri="{FF2B5EF4-FFF2-40B4-BE49-F238E27FC236}">
-                <a16:creationId xmlns:a16="http://schemas.microsoft.com/office/drawing/2014/main" id="{9E114149-19E5-4CE5-B9E4-95A2009661DD}"/>
+                <a16:creationId xmlns:a16="http://schemas.microsoft.com/office/drawing/2014/main" id="{02B8584F-DFF9-47E8-8C04-DAFFDF47E165}"/>
               </a:ext>
             </a:extLst>
           </p:cNvPr>
@@ -20057,7 +20296,7 @@
     </p:spTree>
     <p:extLst>
       <p:ext uri="{BB962C8B-B14F-4D97-AF65-F5344CB8AC3E}">
-        <p14:creationId xmlns:p14="http://schemas.microsoft.com/office/powerpoint/2010/main" val="1493592576"/>
+        <p14:creationId xmlns:p14="http://schemas.microsoft.com/office/powerpoint/2010/main" val="2674020621"/>
       </p:ext>
     </p:extLst>
   </p:cSld>
@@ -20849,6 +21088,175 @@
       <p:bgPr>
         <a:gradFill>
           <a:gsLst>
+            <a:gs pos="20000">
+              <a:schemeClr val="accent1">
+                <a:lumMod val="5000"/>
+                <a:lumOff val="95000"/>
+              </a:schemeClr>
+            </a:gs>
+            <a:gs pos="55000">
+              <a:schemeClr val="accent1">
+                <a:lumMod val="45000"/>
+                <a:lumOff val="55000"/>
+              </a:schemeClr>
+            </a:gs>
+            <a:gs pos="83000">
+              <a:schemeClr val="accent1">
+                <a:lumMod val="45000"/>
+                <a:lumOff val="55000"/>
+              </a:schemeClr>
+            </a:gs>
+            <a:gs pos="100000">
+              <a:schemeClr val="accent1">
+                <a:lumMod val="30000"/>
+                <a:lumOff val="70000"/>
+              </a:schemeClr>
+            </a:gs>
+          </a:gsLst>
+          <a:lin ang="5400000" scaled="1"/>
+        </a:gradFill>
+        <a:effectLst/>
+      </p:bgPr>
+    </p:bg>
+    <p:spTree>
+      <p:nvGrpSpPr>
+        <p:cNvPr id="1" name=""/>
+        <p:cNvGrpSpPr/>
+        <p:nvPr/>
+      </p:nvGrpSpPr>
+      <p:grpSpPr>
+        <a:xfrm>
+          <a:off x="0" y="0"/>
+          <a:ext cx="0" cy="0"/>
+          <a:chOff x="0" y="0"/>
+          <a:chExt cx="0" cy="0"/>
+        </a:xfrm>
+      </p:grpSpPr>
+      <p:sp>
+        <p:nvSpPr>
+          <p:cNvPr id="2" name="Title 1">
+            <a:extLst>
+              <a:ext uri="{FF2B5EF4-FFF2-40B4-BE49-F238E27FC236}">
+                <a16:creationId xmlns:a16="http://schemas.microsoft.com/office/drawing/2014/main" id="{34E1DDED-AC9A-4208-A7A3-ED93E965CB62}"/>
+              </a:ext>
+            </a:extLst>
+          </p:cNvPr>
+          <p:cNvSpPr>
+            <a:spLocks noGrp="1"/>
+          </p:cNvSpPr>
+          <p:nvPr>
+            <p:ph type="title"/>
+          </p:nvPr>
+        </p:nvSpPr>
+        <p:spPr/>
+        <p:txBody>
+          <a:bodyPr/>
+          <a:lstStyle/>
+          <a:p>
+            <a:r>
+              <a:rPr lang="en-GB" dirty="0"/>
+              <a:t>Conclusions</a:t>
+            </a:r>
+          </a:p>
+        </p:txBody>
+      </p:sp>
+      <p:sp>
+        <p:nvSpPr>
+          <p:cNvPr id="3" name="Content Placeholder 2">
+            <a:extLst>
+              <a:ext uri="{FF2B5EF4-FFF2-40B4-BE49-F238E27FC236}">
+                <a16:creationId xmlns:a16="http://schemas.microsoft.com/office/drawing/2014/main" id="{6C9C9E65-D10B-4CD2-BE37-9B781D7440F9}"/>
+              </a:ext>
+            </a:extLst>
+          </p:cNvPr>
+          <p:cNvSpPr>
+            <a:spLocks noGrp="1"/>
+          </p:cNvSpPr>
+          <p:nvPr>
+            <p:ph idx="1"/>
+          </p:nvPr>
+        </p:nvSpPr>
+        <p:spPr/>
+        <p:txBody>
+          <a:bodyPr>
+            <a:normAutofit/>
+          </a:bodyPr>
+          <a:lstStyle/>
+          <a:p>
+            <a:r>
+              <a:rPr lang="en-GB" dirty="0"/>
+              <a:t>A necessary implication of the model is that consumers with both lower durable consumption and lower relative excess cannot compete with the consumer for whom both are higher </a:t>
+            </a:r>
+          </a:p>
+          <a:p>
+            <a:r>
+              <a:rPr lang="en-GB" dirty="0"/>
+              <a:t>The framework can be easily extended to other economies – because of surveying difference economies – we rely only on excluding asset costs from non-durable consumption</a:t>
+            </a:r>
+          </a:p>
+          <a:p>
+            <a:endParaRPr lang="en-GB" dirty="0"/>
+          </a:p>
+        </p:txBody>
+      </p:sp>
+      <p:sp>
+        <p:nvSpPr>
+          <p:cNvPr id="4" name="Slide Number Placeholder 3">
+            <a:extLst>
+              <a:ext uri="{FF2B5EF4-FFF2-40B4-BE49-F238E27FC236}">
+                <a16:creationId xmlns:a16="http://schemas.microsoft.com/office/drawing/2014/main" id="{9E114149-19E5-4CE5-B9E4-95A2009661DD}"/>
+              </a:ext>
+            </a:extLst>
+          </p:cNvPr>
+          <p:cNvSpPr>
+            <a:spLocks noGrp="1"/>
+          </p:cNvSpPr>
+          <p:nvPr>
+            <p:ph type="sldNum" sz="quarter" idx="12"/>
+          </p:nvPr>
+        </p:nvSpPr>
+        <p:spPr/>
+        <p:txBody>
+          <a:bodyPr/>
+          <a:lstStyle/>
+          <a:p>
+            <a:pPr>
+              <a:defRPr/>
+            </a:pPr>
+            <a:fld id="{8E35B453-7314-4BBD-9303-11C6BECC4B0D}" type="slidenum">
+              <a:rPr lang="en-GB" altLang="en-US" smtClean="0"/>
+              <a:pPr>
+                <a:defRPr/>
+              </a:pPr>
+              <a:t>22</a:t>
+            </a:fld>
+            <a:endParaRPr lang="en-GB" altLang="en-US" dirty="0"/>
+          </a:p>
+        </p:txBody>
+      </p:sp>
+    </p:spTree>
+    <p:extLst>
+      <p:ext uri="{BB962C8B-B14F-4D97-AF65-F5344CB8AC3E}">
+        <p14:creationId xmlns:p14="http://schemas.microsoft.com/office/powerpoint/2010/main" val="202028748"/>
+      </p:ext>
+    </p:extLst>
+  </p:cSld>
+  <p:clrMapOvr>
+    <a:masterClrMapping/>
+  </p:clrMapOvr>
+  <p:transition>
+    <p:fade/>
+  </p:transition>
+</p:sld>
+</file>
+
+<file path=ppt/slides/slide23.xml><?xml version="1.0" encoding="utf-8"?>
+<p:sld xmlns:a="http://schemas.openxmlformats.org/drawingml/2006/main" xmlns:r="http://schemas.openxmlformats.org/officeDocument/2006/relationships" xmlns:p="http://schemas.openxmlformats.org/presentationml/2006/main">
+  <p:cSld>
+    <p:bg>
+      <p:bgPr>
+        <a:gradFill>
+          <a:gsLst>
             <a:gs pos="24000">
               <a:schemeClr val="accent1">
                 <a:lumMod val="5000"/>
@@ -20987,7 +21395,7 @@
               <a:pPr>
                 <a:defRPr/>
               </a:pPr>
-              <a:t>22</a:t>
+              <a:t>23</a:t>
             </a:fld>
             <a:endParaRPr lang="en-GB" altLang="en-US" dirty="0"/>
           </a:p>
@@ -21009,7 +21417,7 @@
 </p:sld>
 </file>
 
-<file path=ppt/slides/slide23.xml><?xml version="1.0" encoding="utf-8"?>
+<file path=ppt/slides/slide24.xml><?xml version="1.0" encoding="utf-8"?>
 <p:sld xmlns:a="http://schemas.openxmlformats.org/drawingml/2006/main" xmlns:r="http://schemas.openxmlformats.org/officeDocument/2006/relationships" xmlns:p="http://schemas.openxmlformats.org/presentationml/2006/main">
   <p:cSld>
     <p:bg>
@@ -21160,7 +21568,7 @@
               <a:pPr>
                 <a:defRPr/>
               </a:pPr>
-              <a:t>23</a:t>
+              <a:t>24</a:t>
             </a:fld>
             <a:endParaRPr lang="en-GB" altLang="en-US" dirty="0"/>
           </a:p>
@@ -21182,7 +21590,7 @@
 </p:sld>
 </file>
 
-<file path=ppt/slides/slide24.xml><?xml version="1.0" encoding="utf-8"?>
+<file path=ppt/slides/slide25.xml><?xml version="1.0" encoding="utf-8"?>
 <p:sld xmlns:a="http://schemas.openxmlformats.org/drawingml/2006/main" xmlns:r="http://schemas.openxmlformats.org/officeDocument/2006/relationships" xmlns:p="http://schemas.openxmlformats.org/presentationml/2006/main">
   <p:cSld>
     <p:bg>
@@ -21432,7 +21840,7 @@
               <a:pPr>
                 <a:defRPr/>
               </a:pPr>
-              <a:t>24</a:t>
+              <a:t>25</a:t>
             </a:fld>
             <a:endParaRPr lang="en-GB" altLang="en-US" dirty="0"/>
           </a:p>
@@ -21948,19 +22356,19 @@
         <p:spPr/>
         <p:txBody>
           <a:bodyPr>
-            <a:normAutofit fontScale="92500" lnSpcReduction="10000"/>
+            <a:normAutofit fontScale="92500"/>
           </a:bodyPr>
           <a:lstStyle/>
           <a:p>
             <a:r>
               <a:rPr lang="en-GB" dirty="0"/>
-              <a:t>Before we talk about a model for status consumption, let’s clarify if status – viewed as a social position based on wealth/occupation – should determines consumption or if instead consumption itself predominantly drives status </a:t>
+              <a:t>Before we talk about a model for status consumption, consider if status – viewed as a social position based on wealth/occupation –determines consumption or if instead, consumption itself predominantly drives status </a:t>
             </a:r>
           </a:p>
           <a:p>
             <a:r>
               <a:rPr lang="en-GB" dirty="0"/>
-              <a:t>This is a rather empirical question and requires us to define what status and status goods mean in a particular socio-cultural context</a:t>
+              <a:t>This is an empirical assessment and requires us to define what status and status goods mean in a particular socio-cultural context</a:t>
             </a:r>
           </a:p>
           <a:p>
@@ -21972,7 +22380,7 @@
           <a:p>
             <a:r>
               <a:rPr lang="en-GB" dirty="0"/>
-              <a:t>This is more general than the visible goods perspective – which requires evaluating socio-cultural differences – and serves may serve as a more generic way of comparing status consumption across disparate economies</a:t>
+              <a:t>This is more general than the visible goods view and serves as a generic way of comparing status consumption across different economies</a:t>
             </a:r>
           </a:p>
         </p:txBody>
@@ -22498,13 +22906,13 @@
         <p:spPr/>
         <p:txBody>
           <a:bodyPr>
-            <a:normAutofit fontScale="85000" lnSpcReduction="20000"/>
+            <a:normAutofit fontScale="92500" lnSpcReduction="10000"/>
           </a:bodyPr>
           <a:lstStyle/>
           <a:p>
             <a:r>
               <a:rPr lang="en-GB" i="1" dirty="0"/>
-              <a:t>Consumption in Excess of Needs – but what are needs? </a:t>
+              <a:t>How do we define needs? </a:t>
             </a:r>
           </a:p>
           <a:p>
@@ -22519,14 +22927,7 @@
             </a:r>
             <a:r>
               <a:rPr lang="en-GB" dirty="0"/>
-              <a:t>-Gough view and consider needs as only a guarantee of health and autonomy</a:t>
-            </a:r>
-          </a:p>
-          <a:p>
-            <a:pPr lvl="1"/>
-            <a:r>
-              <a:rPr lang="en-GB" dirty="0"/>
-              <a:t>Status is thus not a basic need. </a:t>
+              <a:t>-Gough view and consider needs as only a guarantee of health and autonomy. Therefore status is not a basic need. </a:t>
             </a:r>
           </a:p>
           <a:p>
@@ -22580,18 +22981,8 @@
             </a:r>
             <a:r>
               <a:rPr lang="en-GB" dirty="0"/>
-              <a:t>: We argue that food costs and costs associated with owning a certain durable good (maintenance/repair fees etc.) are needed– but all else qualifies as excess.</a:t>
-            </a:r>
-          </a:p>
-          <a:p>
-            <a:pPr lvl="1"/>
-            <a:r>
-              <a:rPr lang="en-GB" dirty="0"/>
-              <a:t>Household goods (soap, electronics etc.) are not as necessary as food. This motivates a broad classification of items</a:t>
-            </a:r>
-          </a:p>
-          <a:p>
-            <a:endParaRPr lang="en-GB" dirty="0"/>
+              <a:t>: We argue that food would carry some status value in societies where food security problems are widespread</a:t>
+            </a:r>
           </a:p>
           <a:p>
             <a:endParaRPr lang="en-GB" dirty="0"/>

</xml_diff>